<commit_message>
Add Video ti FactCheck Workshop
</commit_message>
<xml_diff>
--- a/FactChecking/wocsa_cestvraica/WOCSA-Diaporama_FactChecking_Workshop.pptx
+++ b/FactChecking/wocsa_cestvraica/WOCSA-Diaporama_FactChecking_Workshop.pptx
@@ -6,7 +6,7 @@
     <p:sldMasterId id="2147483662" r:id="rId2"/>
   </p:sldMasterIdLst>
   <p:notesMasterIdLst>
-    <p:notesMasterId r:id="rId20"/>
+    <p:notesMasterId r:id="rId21"/>
   </p:notesMasterIdLst>
   <p:sldIdLst>
     <p:sldId id="256" r:id="rId6"/>
@@ -23,6 +23,7 @@
     <p:sldId id="267" r:id="rId17"/>
     <p:sldId id="268" r:id="rId18"/>
     <p:sldId id="269" r:id="rId19"/>
+    <p:sldId id="270" r:id="rId20"/>
   </p:sldIdLst>
   <p:sldSz cx="9144000" cy="5143500"/>
   <p:notesSz cx="6858000" cy="9144000"/>
@@ -268,7 +269,7 @@
       </p:grpSpPr>
       <p:sp>
         <p:nvSpPr>
-          <p:cNvPr id="438363320" name="Google Shape;3;n"/>
+          <p:cNvPr id="964062616" name="Google Shape;3;n"/>
           <p:cNvSpPr/>
           <p:nvPr>
             <p:ph type="sldImg" idx="2"/>
@@ -317,7 +318,7 @@
       </p:sp>
       <p:sp>
         <p:nvSpPr>
-          <p:cNvPr id="1137293885" name="Google Shape;4;n"/>
+          <p:cNvPr id="487732726" name="Google Shape;4;n"/>
           <p:cNvSpPr txBox="1"/>
           <p:nvPr>
             <p:ph type="body" idx="1"/>
@@ -694,7 +695,7 @@
       </p:grpSpPr>
       <p:sp>
         <p:nvSpPr>
-          <p:cNvPr id="1727858248" name="Google Shape;139;g2eb522a133c_4_0:notes"/>
+          <p:cNvPr id="333512917" name="Google Shape;139;g2eb522a133c_4_0:notes"/>
           <p:cNvSpPr/>
           <p:nvPr>
             <p:ph type="sldImg" idx="2"/>
@@ -743,7 +744,7 @@
       </p:sp>
       <p:sp>
         <p:nvSpPr>
-          <p:cNvPr id="853042947" name="Google Shape;140;g2eb522a133c_4_0:notes"/>
+          <p:cNvPr id="1318356641" name="Google Shape;140;g2eb522a133c_4_0:notes"/>
           <p:cNvSpPr txBox="1"/>
           <p:nvPr>
             <p:ph type="body" idx="1"/>
@@ -784,7 +785,7 @@
       </p:sp>
       <p:sp>
         <p:nvSpPr>
-          <p:cNvPr id="1871146151" name="Google Shape;141;g2eb522a133c_4_0:notes"/>
+          <p:cNvPr id="2036564700" name="Google Shape;141;g2eb522a133c_4_0:notes"/>
           <p:cNvSpPr txBox="1"/>
           <p:nvPr>
             <p:ph type="sldNum" idx="12"/>
@@ -854,7 +855,7 @@
       </p:grpSpPr>
       <p:sp>
         <p:nvSpPr>
-          <p:cNvPr id="2" name="Slide Image Placeholder 1"/>
+          <p:cNvPr id="990172562" name="Slide Image Placeholder 1"/>
           <p:cNvSpPr>
             <a:spLocks noChangeAspect="1" noGrp="1" noRot="1"/>
           </p:cNvSpPr>
@@ -866,7 +867,7 @@
       </p:sp>
       <p:sp>
         <p:nvSpPr>
-          <p:cNvPr id="3" name="Notes Placeholder 2"/>
+          <p:cNvPr id="797405868" name="Notes Placeholder 2"/>
           <p:cNvSpPr>
             <a:spLocks noGrp="1"/>
           </p:cNvSpPr>
@@ -888,7 +889,7 @@
       </p:sp>
       <p:sp>
         <p:nvSpPr>
-          <p:cNvPr id="4" name="Slide Number Placeholder 3"/>
+          <p:cNvPr id="133339050" name="Slide Number Placeholder 3"/>
           <p:cNvSpPr>
             <a:spLocks noGrp="1"/>
           </p:cNvSpPr>
@@ -939,7 +940,7 @@
       </p:grpSpPr>
       <p:sp>
         <p:nvSpPr>
-          <p:cNvPr id="1997181282" name="Slide Image Placeholder 1"/>
+          <p:cNvPr id="5125473" name="Slide Image Placeholder 1"/>
           <p:cNvSpPr>
             <a:spLocks noChangeAspect="1" noGrp="1" noRot="1"/>
           </p:cNvSpPr>
@@ -951,7 +952,7 @@
       </p:sp>
       <p:sp>
         <p:nvSpPr>
-          <p:cNvPr id="1378611485" name="Notes Placeholder 2"/>
+          <p:cNvPr id="1882307571" name="Notes Placeholder 2"/>
           <p:cNvSpPr>
             <a:spLocks noGrp="1"/>
           </p:cNvSpPr>
@@ -973,7 +974,7 @@
       </p:sp>
       <p:sp>
         <p:nvSpPr>
-          <p:cNvPr id="1193843983" name="Slide Number Placeholder 3"/>
+          <p:cNvPr id="1024790359" name="Slide Number Placeholder 3"/>
           <p:cNvSpPr>
             <a:spLocks noGrp="1"/>
           </p:cNvSpPr>
@@ -1024,7 +1025,7 @@
       </p:grpSpPr>
       <p:sp>
         <p:nvSpPr>
-          <p:cNvPr id="2" name="Slide Image Placeholder 1"/>
+          <p:cNvPr id="1115068322" name="Slide Image Placeholder 1"/>
           <p:cNvSpPr>
             <a:spLocks noChangeAspect="1" noGrp="1" noRot="1"/>
           </p:cNvSpPr>
@@ -1036,7 +1037,7 @@
       </p:sp>
       <p:sp>
         <p:nvSpPr>
-          <p:cNvPr id="3" name="Notes Placeholder 2"/>
+          <p:cNvPr id="1004083520" name="Notes Placeholder 2"/>
           <p:cNvSpPr>
             <a:spLocks noGrp="1"/>
           </p:cNvSpPr>
@@ -1058,7 +1059,7 @@
       </p:sp>
       <p:sp>
         <p:nvSpPr>
-          <p:cNvPr id="4" name="Slide Number Placeholder 3"/>
+          <p:cNvPr id="1954961720" name="Slide Number Placeholder 3"/>
           <p:cNvSpPr>
             <a:spLocks noGrp="1"/>
           </p:cNvSpPr>
@@ -1109,7 +1110,7 @@
       </p:grpSpPr>
       <p:sp>
         <p:nvSpPr>
-          <p:cNvPr id="1859941291" name="Slide Image Placeholder 1"/>
+          <p:cNvPr id="279337146" name="Slide Image Placeholder 1"/>
           <p:cNvSpPr>
             <a:spLocks noChangeAspect="1" noGrp="1" noRot="1"/>
           </p:cNvSpPr>
@@ -1121,7 +1122,7 @@
       </p:sp>
       <p:sp>
         <p:nvSpPr>
-          <p:cNvPr id="1505698813" name="Notes Placeholder 2"/>
+          <p:cNvPr id="119789999" name="Notes Placeholder 2"/>
           <p:cNvSpPr>
             <a:spLocks noGrp="1"/>
           </p:cNvSpPr>
@@ -1143,7 +1144,7 @@
       </p:sp>
       <p:sp>
         <p:nvSpPr>
-          <p:cNvPr id="1634330873" name="Slide Number Placeholder 3"/>
+          <p:cNvPr id="2126335336" name="Slide Number Placeholder 3"/>
           <p:cNvSpPr>
             <a:spLocks noGrp="1"/>
           </p:cNvSpPr>
@@ -1159,7 +1160,7 @@
             <a:pPr>
               <a:defRPr/>
             </a:pPr>
-            <a:fld id="{C202EA47-BEBB-F80A-037E-C4E1EAAFAFA1}" type="slidenum">
+            <a:fld id="{B469CD4F-1E7A-2ECD-B765-DB55F4448C53}" type="slidenum">
               <a:rPr/>
               <a:t/>
             </a:fld>
@@ -1194,7 +1195,7 @@
       </p:grpSpPr>
       <p:sp>
         <p:nvSpPr>
-          <p:cNvPr id="1389478665" name="Slide Image Placeholder 1"/>
+          <p:cNvPr id="258486002" name="Slide Image Placeholder 1"/>
           <p:cNvSpPr>
             <a:spLocks noChangeAspect="1" noGrp="1" noRot="1"/>
           </p:cNvSpPr>
@@ -1206,7 +1207,7 @@
       </p:sp>
       <p:sp>
         <p:nvSpPr>
-          <p:cNvPr id="212143499" name="Notes Placeholder 2"/>
+          <p:cNvPr id="1781424620" name="Notes Placeholder 2"/>
           <p:cNvSpPr>
             <a:spLocks noGrp="1"/>
           </p:cNvSpPr>
@@ -1228,7 +1229,92 @@
       </p:sp>
       <p:sp>
         <p:nvSpPr>
-          <p:cNvPr id="220051513" name="Slide Number Placeholder 3"/>
+          <p:cNvPr id="434691929" name="Slide Number Placeholder 3"/>
+          <p:cNvSpPr>
+            <a:spLocks noGrp="1"/>
+          </p:cNvSpPr>
+          <p:nvPr>
+            <p:ph type="sldNum" sz="quarter" idx="10"/>
+          </p:nvPr>
+        </p:nvSpPr>
+        <p:spPr bwMode="auto"/>
+        <p:txBody>
+          <a:bodyPr/>
+          <a:lstStyle/>
+          <a:p>
+            <a:pPr>
+              <a:defRPr/>
+            </a:pPr>
+            <a:fld id="{C202EA47-BEBB-F80A-037E-C4E1EAAFAFA1}" type="slidenum">
+              <a:rPr/>
+              <a:t/>
+            </a:fld>
+            <a:endParaRPr/>
+          </a:p>
+        </p:txBody>
+      </p:sp>
+    </p:spTree>
+  </p:cSld>
+  <p:clrMapOvr>
+    <a:masterClrMapping/>
+  </p:clrMapOvr>
+</p:notes>
+</file>
+
+<file path=ppt/notesSlides/notesSlide15.xml><?xml version="1.0" encoding="utf-8"?>
+<p:notes xmlns:a="http://schemas.openxmlformats.org/drawingml/2006/main" xmlns:r="http://schemas.openxmlformats.org/officeDocument/2006/relationships" xmlns:p="http://schemas.openxmlformats.org/presentationml/2006/main" xmlns:m="http://schemas.openxmlformats.org/officeDocument/2006/math" xmlns:w="http://schemas.openxmlformats.org/wordprocessingml/2006/main">
+  <p:cSld name="">
+    <p:spTree>
+      <p:nvGrpSpPr>
+        <p:cNvPr id="1" name=""/>
+        <p:cNvGrpSpPr/>
+        <p:nvPr/>
+      </p:nvGrpSpPr>
+      <p:grpSpPr bwMode="auto">
+        <a:xfrm>
+          <a:off x="0" y="0"/>
+          <a:ext cx="0" cy="0"/>
+          <a:chOff x="0" y="0"/>
+          <a:chExt cx="0" cy="0"/>
+        </a:xfrm>
+      </p:grpSpPr>
+      <p:sp>
+        <p:nvSpPr>
+          <p:cNvPr id="662825593" name="Slide Image Placeholder 1"/>
+          <p:cNvSpPr>
+            <a:spLocks noChangeAspect="1" noGrp="1" noRot="1"/>
+          </p:cNvSpPr>
+          <p:nvPr>
+            <p:ph type="sldImg"/>
+          </p:nvPr>
+        </p:nvSpPr>
+        <p:spPr bwMode="auto"/>
+      </p:sp>
+      <p:sp>
+        <p:nvSpPr>
+          <p:cNvPr id="1781498017" name="Notes Placeholder 2"/>
+          <p:cNvSpPr>
+            <a:spLocks noGrp="1"/>
+          </p:cNvSpPr>
+          <p:nvPr>
+            <p:ph type="body" idx="1"/>
+          </p:nvPr>
+        </p:nvSpPr>
+        <p:spPr bwMode="auto"/>
+        <p:txBody>
+          <a:bodyPr/>
+          <a:lstStyle/>
+          <a:p>
+            <a:pPr>
+              <a:defRPr/>
+            </a:pPr>
+            <a:endParaRPr/>
+          </a:p>
+        </p:txBody>
+      </p:sp>
+      <p:sp>
+        <p:nvSpPr>
+          <p:cNvPr id="1959486743" name="Slide Number Placeholder 3"/>
           <p:cNvSpPr>
             <a:spLocks noGrp="1"/>
           </p:cNvSpPr>
@@ -1279,7 +1365,7 @@
       </p:grpSpPr>
       <p:sp>
         <p:nvSpPr>
-          <p:cNvPr id="2140491668" name="Slide Image Placeholder 1"/>
+          <p:cNvPr id="1042989197" name="Slide Image Placeholder 1"/>
           <p:cNvSpPr>
             <a:spLocks noChangeAspect="1" noGrp="1" noRot="1"/>
           </p:cNvSpPr>
@@ -1291,7 +1377,7 @@
       </p:sp>
       <p:sp>
         <p:nvSpPr>
-          <p:cNvPr id="1264446438" name="Notes Placeholder 2"/>
+          <p:cNvPr id="1142980055" name="Notes Placeholder 2"/>
           <p:cNvSpPr>
             <a:spLocks noGrp="1"/>
           </p:cNvSpPr>
@@ -1313,7 +1399,7 @@
       </p:sp>
       <p:sp>
         <p:nvSpPr>
-          <p:cNvPr id="640490174" name="Slide Number Placeholder 3"/>
+          <p:cNvPr id="1977703903" name="Slide Number Placeholder 3"/>
           <p:cNvSpPr>
             <a:spLocks noGrp="1"/>
           </p:cNvSpPr>
@@ -1364,7 +1450,7 @@
       </p:grpSpPr>
       <p:sp>
         <p:nvSpPr>
-          <p:cNvPr id="630479219" name="Slide Image Placeholder 1"/>
+          <p:cNvPr id="1681343533" name="Slide Image Placeholder 1"/>
           <p:cNvSpPr>
             <a:spLocks noChangeAspect="1" noGrp="1" noRot="1"/>
           </p:cNvSpPr>
@@ -1376,7 +1462,7 @@
       </p:sp>
       <p:sp>
         <p:nvSpPr>
-          <p:cNvPr id="1757793195" name="Notes Placeholder 2"/>
+          <p:cNvPr id="1200943772" name="Notes Placeholder 2"/>
           <p:cNvSpPr>
             <a:spLocks noGrp="1"/>
           </p:cNvSpPr>
@@ -1398,7 +1484,7 @@
       </p:sp>
       <p:sp>
         <p:nvSpPr>
-          <p:cNvPr id="1055961613" name="Slide Number Placeholder 3"/>
+          <p:cNvPr id="1984212676" name="Slide Number Placeholder 3"/>
           <p:cNvSpPr>
             <a:spLocks noGrp="1"/>
           </p:cNvSpPr>
@@ -1449,7 +1535,7 @@
       </p:grpSpPr>
       <p:sp>
         <p:nvSpPr>
-          <p:cNvPr id="1489646069" name="Slide Image Placeholder 1"/>
+          <p:cNvPr id="224536318" name="Slide Image Placeholder 1"/>
           <p:cNvSpPr>
             <a:spLocks noChangeAspect="1" noGrp="1" noRot="1"/>
           </p:cNvSpPr>
@@ -1461,7 +1547,7 @@
       </p:sp>
       <p:sp>
         <p:nvSpPr>
-          <p:cNvPr id="1565810155" name="Notes Placeholder 2"/>
+          <p:cNvPr id="1597858925" name="Notes Placeholder 2"/>
           <p:cNvSpPr>
             <a:spLocks noGrp="1"/>
           </p:cNvSpPr>
@@ -1483,7 +1569,7 @@
       </p:sp>
       <p:sp>
         <p:nvSpPr>
-          <p:cNvPr id="130464994" name="Slide Number Placeholder 3"/>
+          <p:cNvPr id="773313730" name="Slide Number Placeholder 3"/>
           <p:cNvSpPr>
             <a:spLocks noGrp="1"/>
           </p:cNvSpPr>
@@ -1534,7 +1620,7 @@
       </p:grpSpPr>
       <p:sp>
         <p:nvSpPr>
-          <p:cNvPr id="698419958" name="Slide Image Placeholder 1"/>
+          <p:cNvPr id="962923775" name="Slide Image Placeholder 1"/>
           <p:cNvSpPr>
             <a:spLocks noChangeAspect="1" noGrp="1" noRot="1"/>
           </p:cNvSpPr>
@@ -1546,7 +1632,7 @@
       </p:sp>
       <p:sp>
         <p:nvSpPr>
-          <p:cNvPr id="1755066124" name="Notes Placeholder 2"/>
+          <p:cNvPr id="1670191674" name="Notes Placeholder 2"/>
           <p:cNvSpPr>
             <a:spLocks noGrp="1"/>
           </p:cNvSpPr>
@@ -1568,7 +1654,7 @@
       </p:sp>
       <p:sp>
         <p:nvSpPr>
-          <p:cNvPr id="1372012267" name="Slide Number Placeholder 3"/>
+          <p:cNvPr id="1410458592" name="Slide Number Placeholder 3"/>
           <p:cNvSpPr>
             <a:spLocks noGrp="1"/>
           </p:cNvSpPr>
@@ -1619,7 +1705,7 @@
       </p:grpSpPr>
       <p:sp>
         <p:nvSpPr>
-          <p:cNvPr id="1048255855" name="Slide Image Placeholder 1"/>
+          <p:cNvPr id="1106966316" name="Slide Image Placeholder 1"/>
           <p:cNvSpPr>
             <a:spLocks noChangeAspect="1" noGrp="1" noRot="1"/>
           </p:cNvSpPr>
@@ -1631,7 +1717,7 @@
       </p:sp>
       <p:sp>
         <p:nvSpPr>
-          <p:cNvPr id="451405162" name="Notes Placeholder 2"/>
+          <p:cNvPr id="508481888" name="Notes Placeholder 2"/>
           <p:cNvSpPr>
             <a:spLocks noGrp="1"/>
           </p:cNvSpPr>
@@ -1653,7 +1739,7 @@
       </p:sp>
       <p:sp>
         <p:nvSpPr>
-          <p:cNvPr id="345233782" name="Slide Number Placeholder 3"/>
+          <p:cNvPr id="109335892" name="Slide Number Placeholder 3"/>
           <p:cNvSpPr>
             <a:spLocks noGrp="1"/>
           </p:cNvSpPr>
@@ -1704,7 +1790,7 @@
       </p:grpSpPr>
       <p:sp>
         <p:nvSpPr>
-          <p:cNvPr id="1409438125" name="Slide Image Placeholder 1"/>
+          <p:cNvPr id="2113062538" name="Slide Image Placeholder 1"/>
           <p:cNvSpPr>
             <a:spLocks noChangeAspect="1" noGrp="1" noRot="1"/>
           </p:cNvSpPr>
@@ -1716,7 +1802,7 @@
       </p:sp>
       <p:sp>
         <p:nvSpPr>
-          <p:cNvPr id="1327267698" name="Notes Placeholder 2"/>
+          <p:cNvPr id="2050916940" name="Notes Placeholder 2"/>
           <p:cNvSpPr>
             <a:spLocks noGrp="1"/>
           </p:cNvSpPr>
@@ -1738,7 +1824,7 @@
       </p:sp>
       <p:sp>
         <p:nvSpPr>
-          <p:cNvPr id="922493663" name="Slide Number Placeholder 3"/>
+          <p:cNvPr id="1241742568" name="Slide Number Placeholder 3"/>
           <p:cNvSpPr>
             <a:spLocks noGrp="1"/>
           </p:cNvSpPr>
@@ -1789,7 +1875,7 @@
       </p:grpSpPr>
       <p:sp>
         <p:nvSpPr>
-          <p:cNvPr id="449844516" name="Slide Image Placeholder 1"/>
+          <p:cNvPr id="1963777838" name="Slide Image Placeholder 1"/>
           <p:cNvSpPr>
             <a:spLocks noChangeAspect="1" noGrp="1" noRot="1"/>
           </p:cNvSpPr>
@@ -1801,7 +1887,7 @@
       </p:sp>
       <p:sp>
         <p:nvSpPr>
-          <p:cNvPr id="1245061655" name="Notes Placeholder 2"/>
+          <p:cNvPr id="1340796318" name="Notes Placeholder 2"/>
           <p:cNvSpPr>
             <a:spLocks noGrp="1"/>
           </p:cNvSpPr>
@@ -1823,7 +1909,7 @@
       </p:sp>
       <p:sp>
         <p:nvSpPr>
-          <p:cNvPr id="1700377334" name="Slide Number Placeholder 3"/>
+          <p:cNvPr id="345646885" name="Slide Number Placeholder 3"/>
           <p:cNvSpPr>
             <a:spLocks noGrp="1"/>
           </p:cNvSpPr>
@@ -1874,7 +1960,7 @@
       </p:grpSpPr>
       <p:sp>
         <p:nvSpPr>
-          <p:cNvPr id="1234990223" name="Slide Image Placeholder 1"/>
+          <p:cNvPr id="914618132" name="Slide Image Placeholder 1"/>
           <p:cNvSpPr>
             <a:spLocks noChangeAspect="1" noGrp="1" noRot="1"/>
           </p:cNvSpPr>
@@ -1886,7 +1972,7 @@
       </p:sp>
       <p:sp>
         <p:nvSpPr>
-          <p:cNvPr id="280700476" name="Notes Placeholder 2"/>
+          <p:cNvPr id="9443302" name="Notes Placeholder 2"/>
           <p:cNvSpPr>
             <a:spLocks noGrp="1"/>
           </p:cNvSpPr>
@@ -1908,7 +1994,7 @@
       </p:sp>
       <p:sp>
         <p:nvSpPr>
-          <p:cNvPr id="1445077903" name="Slide Number Placeholder 3"/>
+          <p:cNvPr id="857968476" name="Slide Number Placeholder 3"/>
           <p:cNvSpPr>
             <a:spLocks noGrp="1"/>
           </p:cNvSpPr>
@@ -1959,7 +2045,7 @@
       </p:grpSpPr>
       <p:sp>
         <p:nvSpPr>
-          <p:cNvPr id="27450766" name="Google Shape;10;p2"/>
+          <p:cNvPr id="1311606760" name="Google Shape;10;p2"/>
           <p:cNvSpPr txBox="1"/>
           <p:nvPr>
             <p:ph type="ctrTitle"/>
@@ -2089,7 +2175,7 @@
       </p:sp>
       <p:sp>
         <p:nvSpPr>
-          <p:cNvPr id="1994146679" name="Google Shape;11;p2"/>
+          <p:cNvPr id="1986121047" name="Google Shape;11;p2"/>
           <p:cNvSpPr txBox="1"/>
           <p:nvPr>
             <p:ph type="subTitle" idx="1"/>
@@ -2246,7 +2332,7 @@
       </p:sp>
       <p:sp>
         <p:nvSpPr>
-          <p:cNvPr id="63289820" name="Google Shape;12;p2"/>
+          <p:cNvPr id="1170337912" name="Google Shape;12;p2"/>
           <p:cNvSpPr txBox="1"/>
           <p:nvPr>
             <p:ph type="sldNum" idx="12"/>
@@ -2349,7 +2435,7 @@
       </p:grpSpPr>
       <p:sp>
         <p:nvSpPr>
-          <p:cNvPr id="386351877" name="Google Shape;45;p11"/>
+          <p:cNvPr id="1779035202" name="Google Shape;45;p11"/>
           <p:cNvSpPr txBox="1"/>
           <p:nvPr>
             <p:ph type="title" hasCustomPrompt="1"/>
@@ -2483,7 +2569,7 @@
       </p:sp>
       <p:sp>
         <p:nvSpPr>
-          <p:cNvPr id="1654583520" name="Google Shape;46;p11"/>
+          <p:cNvPr id="56355016" name="Google Shape;46;p11"/>
           <p:cNvSpPr txBox="1"/>
           <p:nvPr>
             <p:ph type="body" idx="1"/>
@@ -2613,7 +2699,7 @@
       </p:sp>
       <p:sp>
         <p:nvSpPr>
-          <p:cNvPr id="299311692" name="Google Shape;47;p11"/>
+          <p:cNvPr id="395946302" name="Google Shape;47;p11"/>
           <p:cNvSpPr txBox="1"/>
           <p:nvPr>
             <p:ph type="sldNum" idx="12"/>
@@ -2716,7 +2802,7 @@
       </p:grpSpPr>
       <p:sp>
         <p:nvSpPr>
-          <p:cNvPr id="105854843" name="Google Shape;49;p12"/>
+          <p:cNvPr id="198524694" name="Google Shape;49;p12"/>
           <p:cNvSpPr txBox="1"/>
           <p:nvPr>
             <p:ph type="sldNum" idx="12"/>
@@ -2826,7 +2912,7 @@
       </p:grpSpPr>
       <p:pic>
         <p:nvPicPr>
-          <p:cNvPr id="126291966" name="Google Shape;51;p13"/>
+          <p:cNvPr id="570448070" name="Google Shape;51;p13"/>
           <p:cNvPicPr/>
           <p:nvPr/>
         </p:nvPicPr>
@@ -2853,7 +2939,7 @@
       </p:pic>
       <p:pic>
         <p:nvPicPr>
-          <p:cNvPr id="1370872756" name="Google Shape;52;p13"/>
+          <p:cNvPr id="758910713" name="Google Shape;52;p13"/>
           <p:cNvPicPr/>
           <p:nvPr/>
         </p:nvPicPr>
@@ -2880,7 +2966,7 @@
       </p:pic>
       <p:sp>
         <p:nvSpPr>
-          <p:cNvPr id="867964428" name="Google Shape;53;p13"/>
+          <p:cNvPr id="526552652" name="Google Shape;53;p13"/>
           <p:cNvSpPr txBox="1"/>
           <p:nvPr/>
         </p:nvSpPr>
@@ -2937,7 +3023,7 @@
       </p:sp>
       <p:sp>
         <p:nvSpPr>
-          <p:cNvPr id="1430519226" name="Google Shape;54;p13"/>
+          <p:cNvPr id="798921608" name="Google Shape;54;p13"/>
           <p:cNvSpPr txBox="1"/>
           <p:nvPr/>
         </p:nvSpPr>
@@ -2994,7 +3080,7 @@
       </p:sp>
       <p:sp>
         <p:nvSpPr>
-          <p:cNvPr id="106859526" name="Google Shape;55;p13"/>
+          <p:cNvPr id="1700391939" name="Google Shape;55;p13"/>
           <p:cNvSpPr txBox="1"/>
           <p:nvPr/>
         </p:nvSpPr>
@@ -3044,7 +3130,7 @@
       </p:sp>
       <p:cxnSp>
         <p:nvCxnSpPr>
-          <p:cNvPr id="929472721" name="Google Shape;56;p13"/>
+          <p:cNvPr id="2026160818" name="Google Shape;56;p13"/>
           <p:cNvCxnSpPr/>
           <p:nvPr/>
         </p:nvCxnSpPr>
@@ -3095,7 +3181,7 @@
       </p:grpSpPr>
       <p:sp>
         <p:nvSpPr>
-          <p:cNvPr id="129275673" name="Google Shape;58;p14"/>
+          <p:cNvPr id="1763206203" name="Google Shape;58;p14"/>
           <p:cNvSpPr txBox="1"/>
           <p:nvPr>
             <p:ph type="title"/>
@@ -3240,7 +3326,7 @@
       </p:sp>
       <p:sp>
         <p:nvSpPr>
-          <p:cNvPr id="145734881" name="Google Shape;59;p14"/>
+          <p:cNvPr id="1540259033" name="Google Shape;59;p14"/>
           <p:cNvSpPr txBox="1"/>
           <p:nvPr>
             <p:ph type="body" idx="1"/>
@@ -3433,7 +3519,7 @@
       </p:sp>
       <p:cxnSp>
         <p:nvCxnSpPr>
-          <p:cNvPr id="1508093781" name="Google Shape;60;p14"/>
+          <p:cNvPr id="136182583" name="Google Shape;60;p14"/>
           <p:cNvCxnSpPr/>
           <p:nvPr/>
         </p:nvCxnSpPr>
@@ -3459,7 +3545,7 @@
       </p:cxnSp>
       <p:sp>
         <p:nvSpPr>
-          <p:cNvPr id="81445674" name="Google Shape;61;p14"/>
+          <p:cNvPr id="266689344" name="Google Shape;61;p14"/>
           <p:cNvSpPr txBox="1"/>
           <p:nvPr/>
         </p:nvSpPr>
@@ -3516,7 +3602,7 @@
       </p:sp>
       <p:cxnSp>
         <p:nvCxnSpPr>
-          <p:cNvPr id="1474183183" name="Google Shape;62;p14"/>
+          <p:cNvPr id="1892382916" name="Google Shape;62;p14"/>
           <p:cNvCxnSpPr/>
           <p:nvPr/>
         </p:nvCxnSpPr>
@@ -3542,7 +3628,7 @@
       </p:cxnSp>
       <p:cxnSp>
         <p:nvCxnSpPr>
-          <p:cNvPr id="753065025" name="Google Shape;63;p14"/>
+          <p:cNvPr id="337385175" name="Google Shape;63;p14"/>
           <p:cNvCxnSpPr/>
           <p:nvPr/>
         </p:nvCxnSpPr>
@@ -3568,7 +3654,7 @@
       </p:cxnSp>
       <p:sp>
         <p:nvSpPr>
-          <p:cNvPr id="1484710220" name="Google Shape;64;p14"/>
+          <p:cNvPr id="2055898112" name="Google Shape;64;p14"/>
           <p:cNvSpPr txBox="1"/>
           <p:nvPr>
             <p:ph type="dt" idx="10"/>
@@ -3709,7 +3795,7 @@
       </p:sp>
       <p:cxnSp>
         <p:nvCxnSpPr>
-          <p:cNvPr id="787640302" name="Google Shape;65;p14"/>
+          <p:cNvPr id="1589270345" name="Google Shape;65;p14"/>
           <p:cNvCxnSpPr/>
           <p:nvPr/>
         </p:nvCxnSpPr>
@@ -3735,7 +3821,7 @@
       </p:cxnSp>
       <p:cxnSp>
         <p:nvCxnSpPr>
-          <p:cNvPr id="753931464" name="Google Shape;66;p14"/>
+          <p:cNvPr id="957764951" name="Google Shape;66;p14"/>
           <p:cNvCxnSpPr/>
           <p:nvPr/>
         </p:nvCxnSpPr>
@@ -3761,7 +3847,7 @@
       </p:cxnSp>
       <p:cxnSp>
         <p:nvCxnSpPr>
-          <p:cNvPr id="979030329" name="Google Shape;67;p14"/>
+          <p:cNvPr id="1502547183" name="Google Shape;67;p14"/>
           <p:cNvCxnSpPr/>
           <p:nvPr/>
         </p:nvCxnSpPr>
@@ -3787,7 +3873,7 @@
       </p:cxnSp>
       <p:sp>
         <p:nvSpPr>
-          <p:cNvPr id="811242666" name="Google Shape;68;p14"/>
+          <p:cNvPr id="1396316247" name="Google Shape;68;p14"/>
           <p:cNvSpPr/>
           <p:nvPr/>
         </p:nvSpPr>
@@ -3835,7 +3921,7 @@
       </p:sp>
       <p:cxnSp>
         <p:nvCxnSpPr>
-          <p:cNvPr id="995554041" name="Google Shape;69;p14"/>
+          <p:cNvPr id="944393222" name="Google Shape;69;p14"/>
           <p:cNvCxnSpPr/>
           <p:nvPr/>
         </p:nvCxnSpPr>
@@ -3861,7 +3947,7 @@
       </p:cxnSp>
       <p:sp>
         <p:nvSpPr>
-          <p:cNvPr id="1633922092" name="Google Shape;70;p14"/>
+          <p:cNvPr id="1260311070" name="Google Shape;70;p14"/>
           <p:cNvSpPr txBox="1"/>
           <p:nvPr>
             <p:ph type="ftr" idx="11"/>
@@ -4027,7 +4113,7 @@
       </p:grpSpPr>
       <p:pic>
         <p:nvPicPr>
-          <p:cNvPr id="1475100097" name="Google Shape;80;p16"/>
+          <p:cNvPr id="1757319014" name="Google Shape;80;p16"/>
           <p:cNvPicPr/>
           <p:nvPr/>
         </p:nvPicPr>
@@ -4054,7 +4140,7 @@
       </p:pic>
       <p:pic>
         <p:nvPicPr>
-          <p:cNvPr id="570303524" name="Google Shape;81;p16"/>
+          <p:cNvPr id="1443442720" name="Google Shape;81;p16"/>
           <p:cNvPicPr/>
           <p:nvPr/>
         </p:nvPicPr>
@@ -4081,7 +4167,7 @@
       </p:pic>
       <p:sp>
         <p:nvSpPr>
-          <p:cNvPr id="1430240012" name="Google Shape;82;p16"/>
+          <p:cNvPr id="819610681" name="Google Shape;82;p16"/>
           <p:cNvSpPr txBox="1"/>
           <p:nvPr/>
         </p:nvSpPr>
@@ -4138,7 +4224,7 @@
       </p:sp>
       <p:sp>
         <p:nvSpPr>
-          <p:cNvPr id="1638905699" name="Google Shape;83;p16"/>
+          <p:cNvPr id="2075546716" name="Google Shape;83;p16"/>
           <p:cNvSpPr txBox="1"/>
           <p:nvPr/>
         </p:nvSpPr>
@@ -4195,7 +4281,7 @@
       </p:sp>
       <p:sp>
         <p:nvSpPr>
-          <p:cNvPr id="1038130067" name="Google Shape;84;p16"/>
+          <p:cNvPr id="330660692" name="Google Shape;84;p16"/>
           <p:cNvSpPr txBox="1"/>
           <p:nvPr/>
         </p:nvSpPr>
@@ -4245,7 +4331,7 @@
       </p:sp>
       <p:cxnSp>
         <p:nvCxnSpPr>
-          <p:cNvPr id="986581829" name="Google Shape;85;p16"/>
+          <p:cNvPr id="1016082885" name="Google Shape;85;p16"/>
           <p:cNvCxnSpPr/>
           <p:nvPr/>
         </p:nvCxnSpPr>
@@ -4296,7 +4382,7 @@
       </p:grpSpPr>
       <p:sp>
         <p:nvSpPr>
-          <p:cNvPr id="1667132156" name="Google Shape;87;p17"/>
+          <p:cNvPr id="138844563" name="Google Shape;87;p17"/>
           <p:cNvSpPr txBox="1"/>
           <p:nvPr>
             <p:ph type="title"/>
@@ -4441,7 +4527,7 @@
       </p:sp>
       <p:sp>
         <p:nvSpPr>
-          <p:cNvPr id="1288201222" name="Google Shape;88;p17"/>
+          <p:cNvPr id="776539381" name="Google Shape;88;p17"/>
           <p:cNvSpPr txBox="1"/>
           <p:nvPr>
             <p:ph type="body" idx="1"/>
@@ -4634,7 +4720,7 @@
       </p:sp>
       <p:cxnSp>
         <p:nvCxnSpPr>
-          <p:cNvPr id="874822755" name="Google Shape;89;p17"/>
+          <p:cNvPr id="222318626" name="Google Shape;89;p17"/>
           <p:cNvCxnSpPr/>
           <p:nvPr/>
         </p:nvCxnSpPr>
@@ -4660,7 +4746,7 @@
       </p:cxnSp>
       <p:sp>
         <p:nvSpPr>
-          <p:cNvPr id="1328310239" name="Google Shape;90;p17"/>
+          <p:cNvPr id="1234615802" name="Google Shape;90;p17"/>
           <p:cNvSpPr txBox="1"/>
           <p:nvPr/>
         </p:nvSpPr>
@@ -4717,7 +4803,7 @@
       </p:sp>
       <p:cxnSp>
         <p:nvCxnSpPr>
-          <p:cNvPr id="1113384500" name="Google Shape;91;p17"/>
+          <p:cNvPr id="257172566" name="Google Shape;91;p17"/>
           <p:cNvCxnSpPr/>
           <p:nvPr/>
         </p:nvCxnSpPr>
@@ -4743,7 +4829,7 @@
       </p:cxnSp>
       <p:cxnSp>
         <p:nvCxnSpPr>
-          <p:cNvPr id="876136518" name="Google Shape;92;p17"/>
+          <p:cNvPr id="554268126" name="Google Shape;92;p17"/>
           <p:cNvCxnSpPr/>
           <p:nvPr/>
         </p:nvCxnSpPr>
@@ -4769,7 +4855,7 @@
       </p:cxnSp>
       <p:sp>
         <p:nvSpPr>
-          <p:cNvPr id="817797484" name="Google Shape;93;p17"/>
+          <p:cNvPr id="815468165" name="Google Shape;93;p17"/>
           <p:cNvSpPr txBox="1"/>
           <p:nvPr>
             <p:ph type="dt" idx="10"/>
@@ -4910,7 +4996,7 @@
       </p:sp>
       <p:cxnSp>
         <p:nvCxnSpPr>
-          <p:cNvPr id="1191873535" name="Google Shape;94;p17"/>
+          <p:cNvPr id="148827625" name="Google Shape;94;p17"/>
           <p:cNvCxnSpPr/>
           <p:nvPr/>
         </p:nvCxnSpPr>
@@ -4936,7 +5022,7 @@
       </p:cxnSp>
       <p:cxnSp>
         <p:nvCxnSpPr>
-          <p:cNvPr id="140597972" name="Google Shape;95;p17"/>
+          <p:cNvPr id="1086554668" name="Google Shape;95;p17"/>
           <p:cNvCxnSpPr/>
           <p:nvPr/>
         </p:nvCxnSpPr>
@@ -4962,7 +5048,7 @@
       </p:cxnSp>
       <p:cxnSp>
         <p:nvCxnSpPr>
-          <p:cNvPr id="697796344" name="Google Shape;96;p17"/>
+          <p:cNvPr id="1069212462" name="Google Shape;96;p17"/>
           <p:cNvCxnSpPr/>
           <p:nvPr/>
         </p:nvCxnSpPr>
@@ -4988,7 +5074,7 @@
       </p:cxnSp>
       <p:sp>
         <p:nvSpPr>
-          <p:cNvPr id="162261847" name="Google Shape;97;p17"/>
+          <p:cNvPr id="868726163" name="Google Shape;97;p17"/>
           <p:cNvSpPr/>
           <p:nvPr/>
         </p:nvSpPr>
@@ -5036,7 +5122,7 @@
       </p:sp>
       <p:cxnSp>
         <p:nvCxnSpPr>
-          <p:cNvPr id="1604757156" name="Google Shape;98;p17"/>
+          <p:cNvPr id="715947651" name="Google Shape;98;p17"/>
           <p:cNvCxnSpPr/>
           <p:nvPr/>
         </p:nvCxnSpPr>
@@ -5062,7 +5148,7 @@
       </p:cxnSp>
       <p:sp>
         <p:nvSpPr>
-          <p:cNvPr id="1404011329" name="Google Shape;99;p17"/>
+          <p:cNvPr id="1915505294" name="Google Shape;99;p17"/>
           <p:cNvSpPr txBox="1"/>
           <p:nvPr>
             <p:ph type="ftr" idx="11"/>
@@ -5228,7 +5314,7 @@
       </p:grpSpPr>
       <p:pic>
         <p:nvPicPr>
-          <p:cNvPr id="1128536278" name="Google Shape;101;p18"/>
+          <p:cNvPr id="1598668226" name="Google Shape;101;p18"/>
           <p:cNvPicPr/>
           <p:nvPr/>
         </p:nvPicPr>
@@ -5255,7 +5341,7 @@
       </p:pic>
       <p:sp>
         <p:nvSpPr>
-          <p:cNvPr id="753726030" name="Google Shape;102;p18"/>
+          <p:cNvPr id="1603069051" name="Google Shape;102;p18"/>
           <p:cNvSpPr/>
           <p:nvPr/>
         </p:nvSpPr>
@@ -5303,7 +5389,7 @@
       </p:sp>
       <p:sp>
         <p:nvSpPr>
-          <p:cNvPr id="1918231317" name="Google Shape;103;p18"/>
+          <p:cNvPr id="946736739" name="Google Shape;103;p18"/>
           <p:cNvSpPr/>
           <p:nvPr/>
         </p:nvSpPr>
@@ -5357,7 +5443,7 @@
       </p:sp>
       <p:sp>
         <p:nvSpPr>
-          <p:cNvPr id="255820402" name="Google Shape;104;p18"/>
+          <p:cNvPr id="84948720" name="Google Shape;104;p18"/>
           <p:cNvSpPr txBox="1"/>
           <p:nvPr/>
         </p:nvSpPr>
@@ -5407,7 +5493,7 @@
       </p:sp>
       <p:sp>
         <p:nvSpPr>
-          <p:cNvPr id="1214205036" name="Google Shape;105;p18"/>
+          <p:cNvPr id="1351701944" name="Google Shape;105;p18"/>
           <p:cNvSpPr txBox="1"/>
           <p:nvPr>
             <p:ph type="title"/>
@@ -5552,7 +5638,7 @@
       </p:sp>
       <p:cxnSp>
         <p:nvCxnSpPr>
-          <p:cNvPr id="474499438" name="Google Shape;106;p18"/>
+          <p:cNvPr id="67119244" name="Google Shape;106;p18"/>
           <p:cNvCxnSpPr/>
           <p:nvPr/>
         </p:nvCxnSpPr>
@@ -5578,7 +5664,7 @@
       </p:cxnSp>
       <p:cxnSp>
         <p:nvCxnSpPr>
-          <p:cNvPr id="1300214202" name="Google Shape;107;p18"/>
+          <p:cNvPr id="1994429315" name="Google Shape;107;p18"/>
           <p:cNvCxnSpPr/>
           <p:nvPr/>
         </p:nvCxnSpPr>
@@ -5604,7 +5690,7 @@
       </p:cxnSp>
       <p:cxnSp>
         <p:nvCxnSpPr>
-          <p:cNvPr id="1787192641" name="Google Shape;108;p18"/>
+          <p:cNvPr id="1734167425" name="Google Shape;108;p18"/>
           <p:cNvCxnSpPr/>
           <p:nvPr/>
         </p:nvCxnSpPr>
@@ -5630,7 +5716,7 @@
       </p:cxnSp>
       <p:cxnSp>
         <p:nvCxnSpPr>
-          <p:cNvPr id="1120447383" name="Google Shape;109;p18"/>
+          <p:cNvPr id="332781179" name="Google Shape;109;p18"/>
           <p:cNvCxnSpPr/>
           <p:nvPr/>
         </p:nvCxnSpPr>
@@ -5656,7 +5742,7 @@
       </p:cxnSp>
       <p:sp>
         <p:nvSpPr>
-          <p:cNvPr id="2072039115" name="Google Shape;110;p18"/>
+          <p:cNvPr id="883369517" name="Google Shape;110;p18"/>
           <p:cNvSpPr txBox="1"/>
           <p:nvPr/>
         </p:nvSpPr>
@@ -5717,7 +5803,7 @@
       </p:sp>
       <p:cxnSp>
         <p:nvCxnSpPr>
-          <p:cNvPr id="701167020" name="Google Shape;111;p18"/>
+          <p:cNvPr id="1259706375" name="Google Shape;111;p18"/>
           <p:cNvCxnSpPr/>
           <p:nvPr/>
         </p:nvCxnSpPr>
@@ -5743,7 +5829,7 @@
       </p:cxnSp>
       <p:sp>
         <p:nvSpPr>
-          <p:cNvPr id="801112198" name="Google Shape;112;p18"/>
+          <p:cNvPr id="541590946" name="Google Shape;112;p18"/>
           <p:cNvSpPr txBox="1"/>
           <p:nvPr>
             <p:ph type="dt" idx="10"/>
@@ -5884,7 +5970,7 @@
       </p:sp>
       <p:cxnSp>
         <p:nvCxnSpPr>
-          <p:cNvPr id="1650755656" name="Google Shape;113;p18"/>
+          <p:cNvPr id="1878649047" name="Google Shape;113;p18"/>
           <p:cNvCxnSpPr/>
           <p:nvPr/>
         </p:nvCxnSpPr>
@@ -5910,7 +5996,7 @@
       </p:cxnSp>
       <p:sp>
         <p:nvSpPr>
-          <p:cNvPr id="491757236" name="Google Shape;114;p18"/>
+          <p:cNvPr id="498525997" name="Google Shape;114;p18"/>
           <p:cNvSpPr/>
           <p:nvPr/>
         </p:nvSpPr>
@@ -5958,7 +6044,7 @@
       </p:sp>
       <p:cxnSp>
         <p:nvCxnSpPr>
-          <p:cNvPr id="1837784924" name="Google Shape;115;p18"/>
+          <p:cNvPr id="1221332053" name="Google Shape;115;p18"/>
           <p:cNvCxnSpPr/>
           <p:nvPr/>
         </p:nvCxnSpPr>
@@ -5984,7 +6070,7 @@
       </p:cxnSp>
       <p:sp>
         <p:nvSpPr>
-          <p:cNvPr id="1455894889" name="Google Shape;116;p18"/>
+          <p:cNvPr id="1156106220" name="Google Shape;116;p18"/>
           <p:cNvSpPr/>
           <p:nvPr/>
         </p:nvSpPr>
@@ -6032,7 +6118,7 @@
       </p:sp>
       <p:pic>
         <p:nvPicPr>
-          <p:cNvPr id="1526717286" name="Google Shape;117;p18" descr="Une image contenant dessin&#10;&#10;Description générée automatiquement"/>
+          <p:cNvPr id="440106367" name="Google Shape;117;p18" descr="Une image contenant dessin&#10;&#10;Description générée automatiquement"/>
           <p:cNvPicPr/>
           <p:nvPr/>
         </p:nvPicPr>
@@ -6091,7 +6177,7 @@
       </p:grpSpPr>
       <p:sp>
         <p:nvSpPr>
-          <p:cNvPr id="1321528395" name="Google Shape;119;p19"/>
+          <p:cNvPr id="821865478" name="Google Shape;119;p19"/>
           <p:cNvSpPr txBox="1"/>
           <p:nvPr>
             <p:ph type="body" idx="1"/>
@@ -6315,7 +6401,7 @@
       </p:sp>
       <p:sp>
         <p:nvSpPr>
-          <p:cNvPr id="703350103" name="Google Shape;120;p19"/>
+          <p:cNvPr id="779916123" name="Google Shape;120;p19"/>
           <p:cNvSpPr txBox="1"/>
           <p:nvPr>
             <p:ph type="title"/>
@@ -6460,7 +6546,7 @@
       </p:sp>
       <p:cxnSp>
         <p:nvCxnSpPr>
-          <p:cNvPr id="1330807046" name="Google Shape;121;p19"/>
+          <p:cNvPr id="425043927" name="Google Shape;121;p19"/>
           <p:cNvCxnSpPr/>
           <p:nvPr/>
         </p:nvCxnSpPr>
@@ -6486,7 +6572,7 @@
       </p:cxnSp>
       <p:cxnSp>
         <p:nvCxnSpPr>
-          <p:cNvPr id="231159258" name="Google Shape;122;p19"/>
+          <p:cNvPr id="1894779372" name="Google Shape;122;p19"/>
           <p:cNvCxnSpPr/>
           <p:nvPr/>
         </p:nvCxnSpPr>
@@ -6512,7 +6598,7 @@
       </p:cxnSp>
       <p:cxnSp>
         <p:nvCxnSpPr>
-          <p:cNvPr id="1764350584" name="Google Shape;123;p19"/>
+          <p:cNvPr id="220183394" name="Google Shape;123;p19"/>
           <p:cNvCxnSpPr/>
           <p:nvPr/>
         </p:nvCxnSpPr>
@@ -6538,7 +6624,7 @@
       </p:cxnSp>
       <p:sp>
         <p:nvSpPr>
-          <p:cNvPr id="279456774" name="Google Shape;124;p19"/>
+          <p:cNvPr id="1063515233" name="Google Shape;124;p19"/>
           <p:cNvSpPr/>
           <p:nvPr/>
         </p:nvSpPr>
@@ -6586,7 +6672,7 @@
       </p:sp>
       <p:sp>
         <p:nvSpPr>
-          <p:cNvPr id="157801278" name="Google Shape;125;p19"/>
+          <p:cNvPr id="955393925" name="Google Shape;125;p19"/>
           <p:cNvSpPr txBox="1"/>
           <p:nvPr/>
         </p:nvSpPr>
@@ -6636,7 +6722,7 @@
       </p:sp>
       <p:cxnSp>
         <p:nvCxnSpPr>
-          <p:cNvPr id="812204591" name="Google Shape;126;p19"/>
+          <p:cNvPr id="1038152303" name="Google Shape;126;p19"/>
           <p:cNvCxnSpPr/>
           <p:nvPr/>
         </p:nvCxnSpPr>
@@ -6662,7 +6748,7 @@
       </p:cxnSp>
       <p:cxnSp>
         <p:nvCxnSpPr>
-          <p:cNvPr id="1515051231" name="Google Shape;127;p19"/>
+          <p:cNvPr id="2136064597" name="Google Shape;127;p19"/>
           <p:cNvCxnSpPr/>
           <p:nvPr/>
         </p:nvCxnSpPr>
@@ -6688,7 +6774,7 @@
       </p:cxnSp>
       <p:cxnSp>
         <p:nvCxnSpPr>
-          <p:cNvPr id="300418555" name="Google Shape;128;p19"/>
+          <p:cNvPr id="222395189" name="Google Shape;128;p19"/>
           <p:cNvCxnSpPr/>
           <p:nvPr/>
         </p:nvCxnSpPr>
@@ -6714,7 +6800,7 @@
       </p:cxnSp>
       <p:cxnSp>
         <p:nvCxnSpPr>
-          <p:cNvPr id="596778125" name="Google Shape;129;p19"/>
+          <p:cNvPr id="1588173529" name="Google Shape;129;p19"/>
           <p:cNvCxnSpPr/>
           <p:nvPr/>
         </p:nvCxnSpPr>
@@ -6740,7 +6826,7 @@
       </p:cxnSp>
       <p:sp>
         <p:nvSpPr>
-          <p:cNvPr id="249235794" name="Google Shape;130;p19"/>
+          <p:cNvPr id="814663459" name="Google Shape;130;p19"/>
           <p:cNvSpPr txBox="1"/>
           <p:nvPr/>
         </p:nvSpPr>
@@ -6797,7 +6883,7 @@
       </p:sp>
       <p:sp>
         <p:nvSpPr>
-          <p:cNvPr id="402075596" name="Google Shape;131;p19"/>
+          <p:cNvPr id="156906032" name="Google Shape;131;p19"/>
           <p:cNvSpPr/>
           <p:nvPr/>
         </p:nvSpPr>
@@ -6845,7 +6931,7 @@
       </p:sp>
       <p:pic>
         <p:nvPicPr>
-          <p:cNvPr id="1532467605" name="Google Shape;132;p19" descr="Une image contenant dessin&#10;&#10;Description générée automatiquement"/>
+          <p:cNvPr id="718627424" name="Google Shape;132;p19" descr="Une image contenant dessin&#10;&#10;Description générée automatiquement"/>
           <p:cNvPicPr/>
           <p:nvPr/>
         </p:nvPicPr>
@@ -6897,7 +6983,7 @@
       </p:grpSpPr>
       <p:sp>
         <p:nvSpPr>
-          <p:cNvPr id="1038468487" name="Google Shape;134;p20"/>
+          <p:cNvPr id="1219471059" name="Google Shape;134;p20"/>
           <p:cNvSpPr txBox="1"/>
           <p:nvPr>
             <p:ph type="title"/>
@@ -7037,7 +7123,7 @@
       </p:sp>
       <p:sp>
         <p:nvSpPr>
-          <p:cNvPr id="624324600" name="Google Shape;135;p20"/>
+          <p:cNvPr id="1953604812" name="Google Shape;135;p20"/>
           <p:cNvSpPr txBox="1"/>
           <p:nvPr>
             <p:ph type="dt" idx="10"/>
@@ -7171,7 +7257,7 @@
       </p:sp>
       <p:sp>
         <p:nvSpPr>
-          <p:cNvPr id="1527000767" name="Google Shape;136;p20"/>
+          <p:cNvPr id="49661179" name="Google Shape;136;p20"/>
           <p:cNvSpPr txBox="1"/>
           <p:nvPr>
             <p:ph type="ftr" idx="11"/>
@@ -7305,7 +7391,7 @@
       </p:sp>
       <p:sp>
         <p:nvSpPr>
-          <p:cNvPr id="433525028" name="Google Shape;137;p20"/>
+          <p:cNvPr id="1992873782" name="Google Shape;137;p20"/>
           <p:cNvSpPr txBox="1"/>
           <p:nvPr>
             <p:ph type="sldNum" idx="12"/>
@@ -7439,7 +7525,7 @@
       </p:grpSpPr>
       <p:sp>
         <p:nvSpPr>
-          <p:cNvPr id="1988516165" name="Google Shape;14;p3"/>
+          <p:cNvPr id="814158427" name="Google Shape;14;p3"/>
           <p:cNvSpPr txBox="1"/>
           <p:nvPr>
             <p:ph type="title"/>
@@ -7569,7 +7655,7 @@
       </p:sp>
       <p:sp>
         <p:nvSpPr>
-          <p:cNvPr id="1983252756" name="Google Shape;15;p3"/>
+          <p:cNvPr id="28623083" name="Google Shape;15;p3"/>
           <p:cNvSpPr txBox="1"/>
           <p:nvPr>
             <p:ph type="sldNum" idx="12"/>
@@ -7672,7 +7758,7 @@
       </p:grpSpPr>
       <p:sp>
         <p:nvSpPr>
-          <p:cNvPr id="1579598307" name="Google Shape;17;p4"/>
+          <p:cNvPr id="1176985821" name="Google Shape;17;p4"/>
           <p:cNvSpPr txBox="1"/>
           <p:nvPr>
             <p:ph type="title"/>
@@ -7802,7 +7888,7 @@
       </p:sp>
       <p:sp>
         <p:nvSpPr>
-          <p:cNvPr id="1578836935" name="Google Shape;18;p4"/>
+          <p:cNvPr id="272216019" name="Google Shape;18;p4"/>
           <p:cNvSpPr txBox="1"/>
           <p:nvPr>
             <p:ph type="body" idx="1"/>
@@ -7932,7 +8018,7 @@
       </p:sp>
       <p:sp>
         <p:nvSpPr>
-          <p:cNvPr id="1641287125" name="Google Shape;19;p4"/>
+          <p:cNvPr id="1152051264" name="Google Shape;19;p4"/>
           <p:cNvSpPr txBox="1"/>
           <p:nvPr>
             <p:ph type="sldNum" idx="12"/>
@@ -8035,7 +8121,7 @@
       </p:grpSpPr>
       <p:sp>
         <p:nvSpPr>
-          <p:cNvPr id="1942820866" name="Google Shape;21;p5"/>
+          <p:cNvPr id="1241258058" name="Google Shape;21;p5"/>
           <p:cNvSpPr txBox="1"/>
           <p:nvPr>
             <p:ph type="title"/>
@@ -8165,7 +8251,7 @@
       </p:sp>
       <p:sp>
         <p:nvSpPr>
-          <p:cNvPr id="1733837312" name="Google Shape;22;p5"/>
+          <p:cNvPr id="1840658652" name="Google Shape;22;p5"/>
           <p:cNvSpPr txBox="1"/>
           <p:nvPr>
             <p:ph type="body" idx="1"/>
@@ -8295,7 +8381,7 @@
       </p:sp>
       <p:sp>
         <p:nvSpPr>
-          <p:cNvPr id="1052831224" name="Google Shape;23;p5"/>
+          <p:cNvPr id="2081797994" name="Google Shape;23;p5"/>
           <p:cNvSpPr txBox="1"/>
           <p:nvPr>
             <p:ph type="body" idx="2"/>
@@ -8425,7 +8511,7 @@
       </p:sp>
       <p:sp>
         <p:nvSpPr>
-          <p:cNvPr id="990797728" name="Google Shape;24;p5"/>
+          <p:cNvPr id="1100631130" name="Google Shape;24;p5"/>
           <p:cNvSpPr txBox="1"/>
           <p:nvPr>
             <p:ph type="sldNum" idx="12"/>
@@ -8528,7 +8614,7 @@
       </p:grpSpPr>
       <p:sp>
         <p:nvSpPr>
-          <p:cNvPr id="903585626" name="Google Shape;26;p6"/>
+          <p:cNvPr id="1928444695" name="Google Shape;26;p6"/>
           <p:cNvSpPr txBox="1"/>
           <p:nvPr>
             <p:ph type="title"/>
@@ -8658,7 +8744,7 @@
       </p:sp>
       <p:sp>
         <p:nvSpPr>
-          <p:cNvPr id="31538713" name="Google Shape;27;p6"/>
+          <p:cNvPr id="1158933002" name="Google Shape;27;p6"/>
           <p:cNvSpPr txBox="1"/>
           <p:nvPr>
             <p:ph type="sldNum" idx="12"/>
@@ -8761,7 +8847,7 @@
       </p:grpSpPr>
       <p:sp>
         <p:nvSpPr>
-          <p:cNvPr id="86907419" name="Google Shape;29;p7"/>
+          <p:cNvPr id="85537974" name="Google Shape;29;p7"/>
           <p:cNvSpPr txBox="1"/>
           <p:nvPr>
             <p:ph type="title"/>
@@ -8891,7 +8977,7 @@
       </p:sp>
       <p:sp>
         <p:nvSpPr>
-          <p:cNvPr id="1848795850" name="Google Shape;30;p7"/>
+          <p:cNvPr id="981313907" name="Google Shape;30;p7"/>
           <p:cNvSpPr txBox="1"/>
           <p:nvPr>
             <p:ph type="body" idx="1"/>
@@ -9021,7 +9107,7 @@
       </p:sp>
       <p:sp>
         <p:nvSpPr>
-          <p:cNvPr id="724783979" name="Google Shape;31;p7"/>
+          <p:cNvPr id="393496472" name="Google Shape;31;p7"/>
           <p:cNvSpPr txBox="1"/>
           <p:nvPr>
             <p:ph type="sldNum" idx="12"/>
@@ -9124,7 +9210,7 @@
       </p:grpSpPr>
       <p:sp>
         <p:nvSpPr>
-          <p:cNvPr id="1100615207" name="Google Shape;33;p8"/>
+          <p:cNvPr id="1328901782" name="Google Shape;33;p8"/>
           <p:cNvSpPr txBox="1"/>
           <p:nvPr>
             <p:ph type="title"/>
@@ -9254,7 +9340,7 @@
       </p:sp>
       <p:sp>
         <p:nvSpPr>
-          <p:cNvPr id="1923566291" name="Google Shape;34;p8"/>
+          <p:cNvPr id="1882837543" name="Google Shape;34;p8"/>
           <p:cNvSpPr txBox="1"/>
           <p:nvPr>
             <p:ph type="sldNum" idx="12"/>
@@ -9357,7 +9443,7 @@
       </p:grpSpPr>
       <p:sp>
         <p:nvSpPr>
-          <p:cNvPr id="1530482046" name="Google Shape;36;p9"/>
+          <p:cNvPr id="1095006922" name="Google Shape;36;p9"/>
           <p:cNvSpPr/>
           <p:nvPr/>
         </p:nvSpPr>
@@ -9398,7 +9484,7 @@
       </p:sp>
       <p:sp>
         <p:nvSpPr>
-          <p:cNvPr id="740336208" name="Google Shape;37;p9"/>
+          <p:cNvPr id="2009374692" name="Google Shape;37;p9"/>
           <p:cNvSpPr txBox="1"/>
           <p:nvPr>
             <p:ph type="title"/>
@@ -9528,7 +9614,7 @@
       </p:sp>
       <p:sp>
         <p:nvSpPr>
-          <p:cNvPr id="1485735907" name="Google Shape;38;p9"/>
+          <p:cNvPr id="404026285" name="Google Shape;38;p9"/>
           <p:cNvSpPr txBox="1"/>
           <p:nvPr>
             <p:ph type="subTitle" idx="1"/>
@@ -9685,7 +9771,7 @@
       </p:sp>
       <p:sp>
         <p:nvSpPr>
-          <p:cNvPr id="258637775" name="Google Shape;39;p9"/>
+          <p:cNvPr id="921325976" name="Google Shape;39;p9"/>
           <p:cNvSpPr txBox="1"/>
           <p:nvPr>
             <p:ph type="body" idx="2"/>
@@ -9815,7 +9901,7 @@
       </p:sp>
       <p:sp>
         <p:nvSpPr>
-          <p:cNvPr id="248232864" name="Google Shape;40;p9"/>
+          <p:cNvPr id="1545657495" name="Google Shape;40;p9"/>
           <p:cNvSpPr txBox="1"/>
           <p:nvPr>
             <p:ph type="sldNum" idx="12"/>
@@ -9918,7 +10004,7 @@
       </p:grpSpPr>
       <p:sp>
         <p:nvSpPr>
-          <p:cNvPr id="1420125931" name="Google Shape;42;p10"/>
+          <p:cNvPr id="855517242" name="Google Shape;42;p10"/>
           <p:cNvSpPr txBox="1"/>
           <p:nvPr>
             <p:ph type="body" idx="1"/>
@@ -9963,7 +10049,7 @@
       </p:sp>
       <p:sp>
         <p:nvSpPr>
-          <p:cNvPr id="395935631" name="Google Shape;43;p10"/>
+          <p:cNvPr id="1512705545" name="Google Shape;43;p10"/>
           <p:cNvSpPr txBox="1"/>
           <p:nvPr>
             <p:ph type="sldNum" idx="12"/>
@@ -10073,7 +10159,7 @@
       </p:grpSpPr>
       <p:sp>
         <p:nvSpPr>
-          <p:cNvPr id="1245198031" name="Google Shape;6;p1"/>
+          <p:cNvPr id="870061067" name="Google Shape;6;p1"/>
           <p:cNvSpPr txBox="1"/>
           <p:nvPr>
             <p:ph type="title"/>
@@ -10270,7 +10356,7 @@
       </p:sp>
       <p:sp>
         <p:nvSpPr>
-          <p:cNvPr id="1847760111" name="Google Shape;7;p1"/>
+          <p:cNvPr id="1327999685" name="Google Shape;7;p1"/>
           <p:cNvSpPr txBox="1"/>
           <p:nvPr>
             <p:ph type="body" idx="1"/>
@@ -10494,7 +10580,7 @@
       </p:sp>
       <p:sp>
         <p:nvSpPr>
-          <p:cNvPr id="1233881189" name="Google Shape;8;p1"/>
+          <p:cNvPr id="2019655495" name="Google Shape;8;p1"/>
           <p:cNvSpPr txBox="1"/>
           <p:nvPr>
             <p:ph type="sldNum" idx="12"/>
@@ -11320,7 +11406,7 @@
       </p:grpSpPr>
       <p:sp>
         <p:nvSpPr>
-          <p:cNvPr id="549842312" name="Google Shape;72;p15"/>
+          <p:cNvPr id="818688641" name="Google Shape;72;p15"/>
           <p:cNvSpPr txBox="1"/>
           <p:nvPr>
             <p:ph type="title"/>
@@ -11468,7 +11554,7 @@
       </p:sp>
       <p:sp>
         <p:nvSpPr>
-          <p:cNvPr id="438511629" name="Google Shape;73;p15"/>
+          <p:cNvPr id="1202893303" name="Google Shape;73;p15"/>
           <p:cNvSpPr txBox="1"/>
           <p:nvPr>
             <p:ph type="body" idx="1"/>
@@ -11728,7 +11814,7 @@
       </p:sp>
       <p:pic>
         <p:nvPicPr>
-          <p:cNvPr id="184170357" name="Google Shape;74;p15" descr="Une image contenant dessin&#10;&#10;Description générée automatiquement"/>
+          <p:cNvPr id="300412686" name="Google Shape;74;p15" descr="Une image contenant dessin&#10;&#10;Description générée automatiquement"/>
           <p:cNvPicPr/>
           <p:nvPr/>
         </p:nvPicPr>
@@ -11755,7 +11841,7 @@
       </p:pic>
       <p:sp>
         <p:nvSpPr>
-          <p:cNvPr id="1102403703" name="Google Shape;75;p15"/>
+          <p:cNvPr id="997721495" name="Google Shape;75;p15"/>
           <p:cNvSpPr txBox="1"/>
           <p:nvPr/>
         </p:nvSpPr>
@@ -11805,7 +11891,7 @@
       </p:sp>
       <p:sp>
         <p:nvSpPr>
-          <p:cNvPr id="16881702" name="Google Shape;76;p15"/>
+          <p:cNvPr id="340207919" name="Google Shape;76;p15"/>
           <p:cNvSpPr txBox="1"/>
           <p:nvPr>
             <p:ph type="dt" idx="10"/>
@@ -12002,7 +12088,7 @@
       </p:sp>
       <p:sp>
         <p:nvSpPr>
-          <p:cNvPr id="1247911303" name="Google Shape;77;p15"/>
+          <p:cNvPr id="1629266479" name="Google Shape;77;p15"/>
           <p:cNvSpPr txBox="1"/>
           <p:nvPr>
             <p:ph type="ftr" idx="11"/>
@@ -12199,7 +12285,7 @@
       </p:sp>
       <p:sp>
         <p:nvSpPr>
-          <p:cNvPr id="1282101324" name="Google Shape;78;p15"/>
+          <p:cNvPr id="167695316" name="Google Shape;78;p15"/>
           <p:cNvSpPr txBox="1"/>
           <p:nvPr>
             <p:ph type="sldNum" idx="12"/>
@@ -13064,7 +13150,7 @@
       </p:grpSpPr>
       <p:sp>
         <p:nvSpPr>
-          <p:cNvPr id="808534281" name=""/>
+          <p:cNvPr id="1332977078" name=""/>
           <p:cNvSpPr txBox="1"/>
           <p:nvPr/>
         </p:nvSpPr>
@@ -13129,7 +13215,7 @@
       </p:grpSpPr>
       <p:pic>
         <p:nvPicPr>
-          <p:cNvPr id="1739846977" name=""/>
+          <p:cNvPr id="534251155" name=""/>
           <p:cNvPicPr>
             <a:picLocks noChangeAspect="1"/>
           </p:cNvPicPr>
@@ -13184,7 +13270,7 @@
       </p:grpSpPr>
       <p:sp>
         <p:nvSpPr>
-          <p:cNvPr id="1428938498" name="Google Shape;17;p4"/>
+          <p:cNvPr id="903012955" name="Google Shape;17;p4"/>
           <p:cNvSpPr txBox="1"/>
           <p:nvPr>
             <p:ph type="title"/>
@@ -13345,7 +13431,7 @@
       </p:sp>
       <p:sp>
         <p:nvSpPr>
-          <p:cNvPr id="2023483712" name="Google Shape;18;p4"/>
+          <p:cNvPr id="696576886" name="Google Shape;18;p4"/>
           <p:cNvSpPr txBox="1"/>
           <p:nvPr>
             <p:ph type="body" idx="1"/>
@@ -13353,7 +13439,7 @@
         </p:nvSpPr>
         <p:spPr bwMode="auto">
           <a:xfrm flipH="0" flipV="0">
-            <a:off x="311696" y="1152470"/>
+            <a:off x="311695" y="1152470"/>
             <a:ext cx="8776089" cy="3898278"/>
           </a:xfrm>
           <a:prstGeom prst="rect">
@@ -13988,7 +14074,7 @@
       </p:sp>
       <p:pic>
         <p:nvPicPr>
-          <p:cNvPr id="2020061189" name=""/>
+          <p:cNvPr id="1988411303" name=""/>
           <p:cNvPicPr>
             <a:picLocks noChangeAspect="1"/>
           </p:cNvPicPr>
@@ -14010,7 +14096,7 @@
       </p:pic>
       <p:pic>
         <p:nvPicPr>
-          <p:cNvPr id="189537439" name=""/>
+          <p:cNvPr id="1873449739" name=""/>
           <p:cNvPicPr>
             <a:picLocks noChangeAspect="1"/>
           </p:cNvPicPr>
@@ -14065,7 +14151,7 @@
       </p:grpSpPr>
       <p:pic>
         <p:nvPicPr>
-          <p:cNvPr id="308935164" name=""/>
+          <p:cNvPr id="264448648" name=""/>
           <p:cNvPicPr>
             <a:picLocks noChangeAspect="1"/>
           </p:cNvPicPr>
@@ -14120,16 +14206,16 @@
       </p:grpSpPr>
       <p:sp>
         <p:nvSpPr>
-          <p:cNvPr id="244544970" name="Google Shape;17;p4"/>
+          <p:cNvPr id="1329388977" name="Google Shape;17;p4"/>
           <p:cNvSpPr txBox="1"/>
           <p:nvPr>
             <p:ph type="title"/>
           </p:nvPr>
         </p:nvSpPr>
         <p:spPr bwMode="auto">
-          <a:xfrm flipH="0" flipV="0">
-            <a:off x="92259" y="1898275"/>
-            <a:ext cx="8995522" cy="1095291"/>
+          <a:xfrm>
+            <a:off x="311697" y="445023"/>
+            <a:ext cx="8520597" cy="572697"/>
           </a:xfrm>
           <a:prstGeom prst="rect">
             <a:avLst/>
@@ -14241,18 +14327,37 @@
             </a:lvl9pPr>
           </a:lstStyle>
           <a:p>
-            <a:pPr algn="ctr">
+            <a:pPr>
               <a:defRPr/>
             </a:pPr>
             <a:r>
-              <a:rPr lang="fr-FR" sz="4800">
+              <a:rPr lang="fr-FR" sz="2000">
                 <a:solidFill>
                   <a:srgbClr val="FB7023"/>
                 </a:solidFill>
               </a:rPr>
-              <a:t>Conclusion</a:t>
+              <a:t>Activité </a:t>
             </a:r>
-            <a:endParaRPr sz="4800">
+            <a:r>
+              <a:rPr lang="fr-FR" sz="2000" b="0" i="0" u="none" strike="noStrike" cap="none" spc="0">
+                <a:solidFill>
+                  <a:srgbClr val="FB7023"/>
+                </a:solidFill>
+                <a:latin typeface="Arial"/>
+                <a:ea typeface="Arial"/>
+                <a:cs typeface="Arial"/>
+              </a:rPr>
+              <a:t>n°3</a:t>
+            </a:r>
+            <a:r>
+              <a:rPr lang="fr-FR" sz="2000">
+                <a:solidFill>
+                  <a:srgbClr val="FB7023"/>
+                </a:solidFill>
+              </a:rPr>
+              <a:t> : Détection IA sur vidéo</a:t>
+            </a:r>
+            <a:endParaRPr lang="fr-FR" sz="2000">
               <a:solidFill>
                 <a:srgbClr val="FB7023"/>
               </a:solidFill>
@@ -14260,9 +14365,332 @@
           </a:p>
         </p:txBody>
       </p:sp>
+      <p:sp>
+        <p:nvSpPr>
+          <p:cNvPr id="1632223234" name="Google Shape;18;p4"/>
+          <p:cNvSpPr txBox="1"/>
+          <p:nvPr>
+            <p:ph type="body" idx="1"/>
+          </p:nvPr>
+        </p:nvSpPr>
+        <p:spPr bwMode="auto">
+          <a:xfrm flipH="0" flipV="0">
+            <a:off x="311694" y="1152469"/>
+            <a:ext cx="8776089" cy="3898278"/>
+          </a:xfrm>
+          <a:prstGeom prst="rect">
+            <a:avLst/>
+          </a:prstGeom>
+        </p:spPr>
+        <p:txBody>
+          <a:bodyPr spcFirstLastPara="1" vertOverflow="overflow" horzOverflow="overflow" vert="horz" wrap="square" lIns="91422" tIns="91422" rIns="91422" bIns="91422" numCol="1" spcCol="0" rtlCol="0" fromWordArt="0" anchor="t" anchorCtr="0" forceAA="0" upright="0" compatLnSpc="0">
+            <a:normAutofit/>
+          </a:bodyPr>
+          <a:lstStyle>
+            <a:lvl1pPr marL="457200" lvl="0" indent="-342900">
+              <a:spcBef>
+                <a:spcPts val="0"/>
+              </a:spcBef>
+              <a:spcAft>
+                <a:spcPts val="0"/>
+              </a:spcAft>
+              <a:buSzPts val="1800"/>
+              <a:buChar char="●"/>
+              <a:defRPr/>
+            </a:lvl1pPr>
+            <a:lvl2pPr marL="914400" lvl="1" indent="-317496">
+              <a:spcBef>
+                <a:spcPts val="0"/>
+              </a:spcBef>
+              <a:spcAft>
+                <a:spcPts val="0"/>
+              </a:spcAft>
+              <a:buSzPts val="1400"/>
+              <a:buChar char="○"/>
+              <a:defRPr/>
+            </a:lvl2pPr>
+            <a:lvl3pPr marL="1371600" lvl="2" indent="-317496">
+              <a:spcBef>
+                <a:spcPts val="0"/>
+              </a:spcBef>
+              <a:spcAft>
+                <a:spcPts val="0"/>
+              </a:spcAft>
+              <a:buSzPts val="1400"/>
+              <a:buChar char="■"/>
+              <a:defRPr/>
+            </a:lvl3pPr>
+            <a:lvl4pPr marL="1828800" lvl="3" indent="-317496">
+              <a:spcBef>
+                <a:spcPts val="0"/>
+              </a:spcBef>
+              <a:spcAft>
+                <a:spcPts val="0"/>
+              </a:spcAft>
+              <a:buSzPts val="1400"/>
+              <a:buChar char="●"/>
+              <a:defRPr/>
+            </a:lvl4pPr>
+            <a:lvl5pPr marL="2286000" lvl="4" indent="-317496">
+              <a:spcBef>
+                <a:spcPts val="0"/>
+              </a:spcBef>
+              <a:spcAft>
+                <a:spcPts val="0"/>
+              </a:spcAft>
+              <a:buSzPts val="1400"/>
+              <a:buChar char="○"/>
+              <a:defRPr/>
+            </a:lvl5pPr>
+            <a:lvl6pPr marL="2743200" lvl="5" indent="-317496">
+              <a:spcBef>
+                <a:spcPts val="0"/>
+              </a:spcBef>
+              <a:spcAft>
+                <a:spcPts val="0"/>
+              </a:spcAft>
+              <a:buSzPts val="1400"/>
+              <a:buChar char="■"/>
+              <a:defRPr/>
+            </a:lvl6pPr>
+            <a:lvl7pPr marL="3200400" lvl="6" indent="-317496">
+              <a:spcBef>
+                <a:spcPts val="0"/>
+              </a:spcBef>
+              <a:spcAft>
+                <a:spcPts val="0"/>
+              </a:spcAft>
+              <a:buSzPts val="1400"/>
+              <a:buChar char="●"/>
+              <a:defRPr/>
+            </a:lvl7pPr>
+            <a:lvl8pPr marL="3657600" lvl="7" indent="-317496">
+              <a:spcBef>
+                <a:spcPts val="0"/>
+              </a:spcBef>
+              <a:spcAft>
+                <a:spcPts val="0"/>
+              </a:spcAft>
+              <a:buSzPts val="1400"/>
+              <a:buChar char="○"/>
+              <a:defRPr/>
+            </a:lvl8pPr>
+            <a:lvl9pPr marL="4114800" lvl="8" indent="-317496">
+              <a:spcBef>
+                <a:spcPts val="0"/>
+              </a:spcBef>
+              <a:spcAft>
+                <a:spcPts val="0"/>
+              </a:spcAft>
+              <a:buSzPts val="1400"/>
+              <a:buChar char="■"/>
+              <a:defRPr/>
+            </a:lvl9pPr>
+          </a:lstStyle>
+          <a:p>
+            <a:pPr>
+              <a:defRPr/>
+            </a:pPr>
+            <a:r>
+              <a:rPr lang="fr-FR" sz="1800" b="0" i="0" u="none" strike="noStrike" cap="none" spc="0">
+                <a:solidFill>
+                  <a:schemeClr val="dk2"/>
+                </a:solidFill>
+                <a:latin typeface="Arial"/>
+                <a:ea typeface="Arial"/>
+                <a:cs typeface="Arial"/>
+              </a:rPr>
+              <a:t>A vous de jouer ! 					           </a:t>
+            </a:r>
+            <a:endParaRPr sz="1800"/>
+          </a:p>
+          <a:p>
+            <a:pPr lvl="1">
+              <a:defRPr/>
+            </a:pPr>
+            <a:r>
+              <a:rPr lang="fr-FR" sz="1400" b="0" i="0" u="none" strike="noStrike" cap="none" spc="0">
+                <a:solidFill>
+                  <a:schemeClr val="dk2"/>
+                </a:solidFill>
+                <a:latin typeface="Arial"/>
+                <a:ea typeface="Arial"/>
+                <a:cs typeface="Arial"/>
+              </a:rPr>
+              <a:t>Étape 1 : Regarder chaque vidéo attentivement</a:t>
+            </a:r>
+            <a:endParaRPr lang="fr-FR" sz="1400" b="0" i="0" u="none" strike="noStrike" cap="none" spc="0">
+              <a:solidFill>
+                <a:schemeClr val="dk2"/>
+              </a:solidFill>
+              <a:latin typeface="Arial"/>
+              <a:ea typeface="Arial"/>
+              <a:cs typeface="Arial"/>
+            </a:endParaRPr>
+          </a:p>
+          <a:p>
+            <a:pPr lvl="1">
+              <a:defRPr/>
+            </a:pPr>
+            <a:r>
+              <a:rPr lang="fr-FR" sz="1400" b="0" i="0" u="none" strike="noStrike" cap="none" spc="0">
+                <a:solidFill>
+                  <a:schemeClr val="dk2"/>
+                </a:solidFill>
+                <a:latin typeface="Arial"/>
+                <a:ea typeface="Arial"/>
+                <a:cs typeface="Arial"/>
+              </a:rPr>
+              <a:t>Étape 2 : Relevez les </a:t>
+            </a:r>
+            <a:r>
+              <a:rPr lang="fr-FR" sz="1400" b="0" i="0" u="none" strike="noStrike" cap="none" spc="0">
+                <a:solidFill>
+                  <a:schemeClr val="dk2"/>
+                </a:solidFill>
+                <a:latin typeface="Arial"/>
+                <a:ea typeface="Arial"/>
+                <a:cs typeface="Arial"/>
+              </a:rPr>
+              <a:t>incohérences et les signes de génération d’IA</a:t>
+            </a:r>
+            <a:endParaRPr lang="fr-FR" sz="1400" b="0" i="0" u="none" strike="noStrike" cap="none" spc="0">
+              <a:solidFill>
+                <a:schemeClr val="dk2"/>
+              </a:solidFill>
+              <a:latin typeface="Arial"/>
+              <a:ea typeface="Arial"/>
+              <a:cs typeface="Arial"/>
+            </a:endParaRPr>
+          </a:p>
+          <a:p>
+            <a:pPr lvl="1">
+              <a:defRPr/>
+            </a:pPr>
+            <a:r>
+              <a:rPr lang="fr-FR" sz="1400" b="0" i="0" u="none" strike="noStrike" cap="none" spc="0">
+                <a:solidFill>
+                  <a:schemeClr val="dk2"/>
+                </a:solidFill>
+                <a:latin typeface="Arial"/>
+                <a:ea typeface="Arial"/>
+                <a:cs typeface="Arial"/>
+              </a:rPr>
+              <a:t>Étape 3 :  </a:t>
+            </a:r>
+            <a:r>
+              <a:rPr lang="fr-FR" sz="1400" b="0" i="0" u="none" strike="noStrike" cap="none" spc="0">
+                <a:solidFill>
+                  <a:schemeClr val="dk2"/>
+                </a:solidFill>
+                <a:latin typeface="Arial"/>
+                <a:ea typeface="Arial"/>
+                <a:cs typeface="Arial"/>
+              </a:rPr>
+              <a:t>Déterminer laquelle des deux a été générée par IA</a:t>
+            </a:r>
+            <a:endParaRPr lang="fr-FR" sz="1400" b="0" i="0" u="none" strike="noStrike" cap="none" spc="0">
+              <a:solidFill>
+                <a:schemeClr val="dk2"/>
+              </a:solidFill>
+              <a:latin typeface="Arial"/>
+              <a:ea typeface="Arial"/>
+              <a:cs typeface="Arial"/>
+            </a:endParaRPr>
+          </a:p>
+          <a:p>
+            <a:pPr lvl="1">
+              <a:defRPr/>
+            </a:pPr>
+            <a:endParaRPr lang="fr-FR" sz="1400" b="0" i="0" u="none" strike="noStrike" cap="none" spc="0">
+              <a:solidFill>
+                <a:schemeClr val="dk2"/>
+              </a:solidFill>
+              <a:latin typeface="Times New Roman"/>
+              <a:cs typeface="Times New Roman"/>
+            </a:endParaRPr>
+          </a:p>
+          <a:p>
+            <a:pPr lvl="1">
+              <a:defRPr/>
+            </a:pPr>
+            <a:endParaRPr lang="fr-FR" sz="1400" b="0" i="0" u="none" strike="noStrike" cap="none" spc="0">
+              <a:solidFill>
+                <a:schemeClr val="dk2"/>
+              </a:solidFill>
+              <a:latin typeface="Times New Roman"/>
+              <a:cs typeface="Times New Roman"/>
+            </a:endParaRPr>
+          </a:p>
+          <a:p>
+            <a:pPr marL="114299" lvl="0" indent="0" algn="ctr">
+              <a:buClr>
+                <a:schemeClr val="dk2"/>
+              </a:buClr>
+              <a:buSzPts val="1800"/>
+              <a:buNone/>
+              <a:defRPr/>
+            </a:pPr>
+            <a:r>
+              <a:rPr lang="fr-FR" sz="1800" b="0" i="0" u="none" strike="noStrike" cap="none" spc="0">
+                <a:solidFill>
+                  <a:srgbClr val="C00000"/>
+                </a:solidFill>
+                <a:latin typeface="Arial"/>
+                <a:ea typeface="Arial"/>
+                <a:cs typeface="Arial"/>
+              </a:rPr>
+              <a:t>https://www.youtube.com/watch?v=oWLHAuUoYqQ</a:t>
+            </a:r>
+            <a:endParaRPr sz="1400" b="0" i="0" u="none" strike="noStrike" cap="none" spc="0">
+              <a:solidFill>
+                <a:srgbClr val="C00000"/>
+              </a:solidFill>
+              <a:latin typeface="Times New Roman"/>
+              <a:cs typeface="Times New Roman"/>
+            </a:endParaRPr>
+          </a:p>
+          <a:p>
+            <a:pPr marL="114297" indent="0">
+              <a:buClr>
+                <a:schemeClr val="dk2"/>
+              </a:buClr>
+              <a:buSzPts val="1800"/>
+              <a:buFont typeface="Arial"/>
+              <a:buNone/>
+              <a:defRPr/>
+            </a:pPr>
+            <a:endParaRPr sz="1400" b="0" i="0" u="none" strike="noStrike" cap="none" spc="0">
+              <a:solidFill>
+                <a:srgbClr val="FF0000"/>
+              </a:solidFill>
+              <a:latin typeface="Arial"/>
+              <a:cs typeface="Arial"/>
+            </a:endParaRPr>
+          </a:p>
+          <a:p>
+            <a:pPr marL="114297" indent="0">
+              <a:buClr>
+                <a:schemeClr val="dk2"/>
+              </a:buClr>
+              <a:buSzPts val="1800"/>
+              <a:buFont typeface="Arial"/>
+              <a:buNone/>
+              <a:defRPr/>
+            </a:pPr>
+            <a:endParaRPr sz="1400" b="0" i="0" u="none" strike="noStrike" cap="none" spc="0">
+              <a:solidFill>
+                <a:srgbClr val="FF0000"/>
+              </a:solidFill>
+              <a:latin typeface="Arial"/>
+              <a:cs typeface="Arial"/>
+            </a:endParaRPr>
+          </a:p>
+        </p:txBody>
+      </p:sp>
       <p:pic>
         <p:nvPicPr>
-          <p:cNvPr id="1232947300" name=""/>
+          <p:cNvPr id="1456635698" name=""/>
           <p:cNvPicPr>
             <a:picLocks noChangeAspect="1"/>
           </p:cNvPicPr>
@@ -14274,8 +14702,8 @@
         </p:blipFill>
         <p:spPr bwMode="auto">
           <a:xfrm flipH="0" flipV="0">
-            <a:off x="7722342" y="61430"/>
-            <a:ext cx="1365444" cy="458787"/>
+            <a:off x="7722342" y="61429"/>
+            <a:ext cx="1365444" cy="458786"/>
           </a:xfrm>
           <a:prstGeom prst="rect">
             <a:avLst/>
@@ -14284,7 +14712,7 @@
       </p:pic>
       <p:pic>
         <p:nvPicPr>
-          <p:cNvPr id="1561882892" name=""/>
+          <p:cNvPr id="1014922678" name=""/>
           <p:cNvPicPr>
             <a:picLocks noChangeAspect="1"/>
           </p:cNvPicPr>
@@ -14296,8 +14724,8 @@
         </p:blipFill>
         <p:spPr bwMode="auto">
           <a:xfrm flipH="0" flipV="0">
-            <a:off x="7931038" y="520218"/>
-            <a:ext cx="948048" cy="942122"/>
+            <a:off x="7931037" y="520218"/>
+            <a:ext cx="948047" cy="942121"/>
           </a:xfrm>
           <a:prstGeom prst="rect">
             <a:avLst/>
@@ -14339,7 +14767,226 @@
       </p:grpSpPr>
       <p:sp>
         <p:nvSpPr>
-          <p:cNvPr id="187404743" name="Google Shape;17;p4"/>
+          <p:cNvPr id="1453780385" name="Google Shape;17;p4"/>
+          <p:cNvSpPr txBox="1"/>
+          <p:nvPr>
+            <p:ph type="title"/>
+          </p:nvPr>
+        </p:nvSpPr>
+        <p:spPr bwMode="auto">
+          <a:xfrm flipH="0" flipV="0">
+            <a:off x="92259" y="1898275"/>
+            <a:ext cx="8995522" cy="1095291"/>
+          </a:xfrm>
+          <a:prstGeom prst="rect">
+            <a:avLst/>
+          </a:prstGeom>
+        </p:spPr>
+        <p:txBody>
+          <a:bodyPr spcFirstLastPara="1" vertOverflow="overflow" horzOverflow="overflow" vert="horz" wrap="square" lIns="91422" tIns="91422" rIns="91422" bIns="91422" numCol="1" spcCol="0" rtlCol="0" fromWordArt="0" anchor="t" anchorCtr="0" forceAA="0" upright="0" compatLnSpc="0">
+            <a:normAutofit/>
+          </a:bodyPr>
+          <a:lstStyle>
+            <a:lvl1pPr lvl="0">
+              <a:spcBef>
+                <a:spcPts val="0"/>
+              </a:spcBef>
+              <a:spcAft>
+                <a:spcPts val="0"/>
+              </a:spcAft>
+              <a:buSzPts val="2800"/>
+              <a:buNone/>
+              <a:defRPr/>
+            </a:lvl1pPr>
+            <a:lvl2pPr lvl="1">
+              <a:spcBef>
+                <a:spcPts val="0"/>
+              </a:spcBef>
+              <a:spcAft>
+                <a:spcPts val="0"/>
+              </a:spcAft>
+              <a:buSzPts val="2800"/>
+              <a:buNone/>
+              <a:defRPr/>
+            </a:lvl2pPr>
+            <a:lvl3pPr lvl="2">
+              <a:spcBef>
+                <a:spcPts val="0"/>
+              </a:spcBef>
+              <a:spcAft>
+                <a:spcPts val="0"/>
+              </a:spcAft>
+              <a:buSzPts val="2800"/>
+              <a:buNone/>
+              <a:defRPr/>
+            </a:lvl3pPr>
+            <a:lvl4pPr lvl="3">
+              <a:spcBef>
+                <a:spcPts val="0"/>
+              </a:spcBef>
+              <a:spcAft>
+                <a:spcPts val="0"/>
+              </a:spcAft>
+              <a:buSzPts val="2800"/>
+              <a:buNone/>
+              <a:defRPr/>
+            </a:lvl4pPr>
+            <a:lvl5pPr lvl="4">
+              <a:spcBef>
+                <a:spcPts val="0"/>
+              </a:spcBef>
+              <a:spcAft>
+                <a:spcPts val="0"/>
+              </a:spcAft>
+              <a:buSzPts val="2800"/>
+              <a:buNone/>
+              <a:defRPr/>
+            </a:lvl5pPr>
+            <a:lvl6pPr lvl="5">
+              <a:spcBef>
+                <a:spcPts val="0"/>
+              </a:spcBef>
+              <a:spcAft>
+                <a:spcPts val="0"/>
+              </a:spcAft>
+              <a:buSzPts val="2800"/>
+              <a:buNone/>
+              <a:defRPr/>
+            </a:lvl6pPr>
+            <a:lvl7pPr lvl="6">
+              <a:spcBef>
+                <a:spcPts val="0"/>
+              </a:spcBef>
+              <a:spcAft>
+                <a:spcPts val="0"/>
+              </a:spcAft>
+              <a:buSzPts val="2800"/>
+              <a:buNone/>
+              <a:defRPr/>
+            </a:lvl7pPr>
+            <a:lvl8pPr lvl="7">
+              <a:spcBef>
+                <a:spcPts val="0"/>
+              </a:spcBef>
+              <a:spcAft>
+                <a:spcPts val="0"/>
+              </a:spcAft>
+              <a:buSzPts val="2800"/>
+              <a:buNone/>
+              <a:defRPr/>
+            </a:lvl8pPr>
+            <a:lvl9pPr lvl="8">
+              <a:spcBef>
+                <a:spcPts val="0"/>
+              </a:spcBef>
+              <a:spcAft>
+                <a:spcPts val="0"/>
+              </a:spcAft>
+              <a:buSzPts val="2800"/>
+              <a:buNone/>
+              <a:defRPr/>
+            </a:lvl9pPr>
+          </a:lstStyle>
+          <a:p>
+            <a:pPr algn="ctr">
+              <a:defRPr/>
+            </a:pPr>
+            <a:r>
+              <a:rPr lang="fr-FR" sz="4800">
+                <a:solidFill>
+                  <a:srgbClr val="FB7023"/>
+                </a:solidFill>
+              </a:rPr>
+              <a:t>Conclusion</a:t>
+            </a:r>
+            <a:endParaRPr sz="4800">
+              <a:solidFill>
+                <a:srgbClr val="FB7023"/>
+              </a:solidFill>
+            </a:endParaRPr>
+          </a:p>
+        </p:txBody>
+      </p:sp>
+      <p:pic>
+        <p:nvPicPr>
+          <p:cNvPr id="25261278" name=""/>
+          <p:cNvPicPr>
+            <a:picLocks noChangeAspect="1"/>
+          </p:cNvPicPr>
+          <p:nvPr/>
+        </p:nvPicPr>
+        <p:blipFill rotWithShape="1">
+          <a:blip r:embed="rId3"/>
+          <a:stretch/>
+        </p:blipFill>
+        <p:spPr bwMode="auto">
+          <a:xfrm flipH="0" flipV="0">
+            <a:off x="7722342" y="61430"/>
+            <a:ext cx="1365444" cy="458787"/>
+          </a:xfrm>
+          <a:prstGeom prst="rect">
+            <a:avLst/>
+          </a:prstGeom>
+        </p:spPr>
+      </p:pic>
+      <p:pic>
+        <p:nvPicPr>
+          <p:cNvPr id="1457108366" name=""/>
+          <p:cNvPicPr>
+            <a:picLocks noChangeAspect="1"/>
+          </p:cNvPicPr>
+          <p:nvPr/>
+        </p:nvPicPr>
+        <p:blipFill rotWithShape="1">
+          <a:blip r:embed="rId4"/>
+          <a:stretch/>
+        </p:blipFill>
+        <p:spPr bwMode="auto">
+          <a:xfrm flipH="0" flipV="0">
+            <a:off x="7931038" y="520218"/>
+            <a:ext cx="948048" cy="942122"/>
+          </a:xfrm>
+          <a:prstGeom prst="rect">
+            <a:avLst/>
+          </a:prstGeom>
+        </p:spPr>
+      </p:pic>
+    </p:spTree>
+  </p:cSld>
+  <p:clrMapOvr>
+    <a:masterClrMapping/>
+  </p:clrMapOvr>
+  <mc:AlternateContent xmlns:mc="http://schemas.openxmlformats.org/markup-compatibility/2006">
+    <mc:Choice xmlns:p159="http://schemas.microsoft.com/office/powerpoint/2015/09/main" xmlns:p14="http://schemas.microsoft.com/office/powerpoint/2010/main" Requires="p159">
+      <p:transition p14:dur="2000" advClick="1"/>
+    </mc:Choice>
+    <mc:Fallback>
+      <p:transition advClick="1"/>
+    </mc:Fallback>
+  </mc:AlternateContent>
+</p:sld>
+</file>
+
+<file path=ppt/slides/slide15.xml><?xml version="1.0" encoding="utf-8"?>
+<p:sld xmlns:a="http://schemas.openxmlformats.org/drawingml/2006/main" xmlns:r="http://schemas.openxmlformats.org/officeDocument/2006/relationships" xmlns:p="http://schemas.openxmlformats.org/presentationml/2006/main" xmlns:m="http://schemas.openxmlformats.org/officeDocument/2006/math" xmlns:w="http://schemas.openxmlformats.org/wordprocessingml/2006/main" xmlns:mc="http://schemas.openxmlformats.org/markup-compatibility/2006" showMasterPhAnim="0" showMasterSp="1" show="1">
+  <p:cSld name="">
+    <p:spTree>
+      <p:nvGrpSpPr>
+        <p:cNvPr id="1" name=""/>
+        <p:cNvGrpSpPr/>
+        <p:nvPr/>
+      </p:nvGrpSpPr>
+      <p:grpSpPr bwMode="auto">
+        <a:xfrm>
+          <a:off x="0" y="0"/>
+          <a:ext cx="0" cy="0"/>
+          <a:chOff x="0" y="0"/>
+          <a:chExt cx="0" cy="0"/>
+        </a:xfrm>
+      </p:grpSpPr>
+      <p:sp>
+        <p:nvSpPr>
+          <p:cNvPr id="503937350" name="Google Shape;17;p4"/>
           <p:cNvSpPr txBox="1"/>
           <p:nvPr>
             <p:ph type="title"/>
@@ -14481,7 +15128,7 @@
       </p:sp>
       <p:sp>
         <p:nvSpPr>
-          <p:cNvPr id="199533329" name="Google Shape;18;p4"/>
+          <p:cNvPr id="1968524727" name="Google Shape;18;p4"/>
           <p:cNvSpPr txBox="1"/>
           <p:nvPr>
             <p:ph type="body" idx="1"/>
@@ -14836,7 +15483,7 @@
       </p:sp>
       <p:pic>
         <p:nvPicPr>
-          <p:cNvPr id="1167456699" name=""/>
+          <p:cNvPr id="1500512969" name=""/>
           <p:cNvPicPr>
             <a:picLocks noChangeAspect="1"/>
           </p:cNvPicPr>
@@ -14858,7 +15505,7 @@
       </p:pic>
       <p:pic>
         <p:nvPicPr>
-          <p:cNvPr id="913755027" name=""/>
+          <p:cNvPr id="2136207233" name=""/>
           <p:cNvPicPr>
             <a:picLocks noChangeAspect="1"/>
           </p:cNvPicPr>
@@ -14880,7 +15527,7 @@
       </p:pic>
       <p:pic>
         <p:nvPicPr>
-          <p:cNvPr id="827407076" name=""/>
+          <p:cNvPr id="611883950" name=""/>
           <p:cNvPicPr>
             <a:picLocks noChangeAspect="1"/>
           </p:cNvPicPr>
@@ -14902,7 +15549,7 @@
       </p:pic>
       <p:pic>
         <p:nvPicPr>
-          <p:cNvPr id="684816224" name=""/>
+          <p:cNvPr id="2141744232" name=""/>
           <p:cNvPicPr>
             <a:picLocks noChangeAspect="1"/>
           </p:cNvPicPr>
@@ -14957,7 +15604,7 @@
       </p:grpSpPr>
       <p:sp>
         <p:nvSpPr>
-          <p:cNvPr id="1871800219" name="Google Shape;17;p4"/>
+          <p:cNvPr id="2103528578" name="Google Shape;17;p4"/>
           <p:cNvSpPr txBox="1"/>
           <p:nvPr>
             <p:ph type="title"/>
@@ -15099,7 +15746,7 @@
       </p:sp>
       <p:sp>
         <p:nvSpPr>
-          <p:cNvPr id="1355340918" name="Google Shape;18;p4"/>
+          <p:cNvPr id="1948861492" name="Google Shape;18;p4"/>
           <p:cNvSpPr txBox="1"/>
           <p:nvPr>
             <p:ph type="body" idx="1"/>
@@ -15551,7 +16198,7 @@
       </p:sp>
       <p:pic>
         <p:nvPicPr>
-          <p:cNvPr id="2003237461" name=""/>
+          <p:cNvPr id="666109904" name=""/>
           <p:cNvPicPr>
             <a:picLocks noChangeAspect="1"/>
           </p:cNvPicPr>
@@ -15573,7 +16220,7 @@
       </p:pic>
       <p:sp>
         <p:nvSpPr>
-          <p:cNvPr id="2127647674" name=""/>
+          <p:cNvPr id="749996003" name=""/>
           <p:cNvSpPr txBox="1"/>
           <p:nvPr/>
         </p:nvSpPr>
@@ -15616,7 +16263,7 @@
       </p:sp>
       <p:pic>
         <p:nvPicPr>
-          <p:cNvPr id="1134685250" name=""/>
+          <p:cNvPr id="1282703864" name=""/>
           <p:cNvPicPr>
             <a:picLocks noChangeAspect="1"/>
           </p:cNvPicPr>
@@ -15671,7 +16318,7 @@
       </p:grpSpPr>
       <p:sp>
         <p:nvSpPr>
-          <p:cNvPr id="40271011" name="Google Shape;17;p4"/>
+          <p:cNvPr id="2021137217" name="Google Shape;17;p4"/>
           <p:cNvSpPr txBox="1"/>
           <p:nvPr>
             <p:ph type="title"/>
@@ -15813,7 +16460,7 @@
       </p:sp>
       <p:sp>
         <p:nvSpPr>
-          <p:cNvPr id="188451215" name="Google Shape;18;p4"/>
+          <p:cNvPr id="1946993946" name="Google Shape;18;p4"/>
           <p:cNvSpPr txBox="1"/>
           <p:nvPr>
             <p:ph type="body" idx="1"/>
@@ -16355,7 +17002,7 @@
       </p:sp>
       <p:pic>
         <p:nvPicPr>
-          <p:cNvPr id="1812328872" name=""/>
+          <p:cNvPr id="352085402" name=""/>
           <p:cNvPicPr>
             <a:picLocks noChangeAspect="1"/>
           </p:cNvPicPr>
@@ -16377,7 +17024,7 @@
       </p:pic>
       <p:sp>
         <p:nvSpPr>
-          <p:cNvPr id="542817303" name=""/>
+          <p:cNvPr id="659475576" name=""/>
           <p:cNvSpPr txBox="1"/>
           <p:nvPr/>
         </p:nvSpPr>
@@ -16420,7 +17067,7 @@
       </p:sp>
       <p:pic>
         <p:nvPicPr>
-          <p:cNvPr id="1426546338" name=""/>
+          <p:cNvPr id="1519161494" name=""/>
           <p:cNvPicPr>
             <a:picLocks noChangeAspect="1"/>
           </p:cNvPicPr>
@@ -16475,7 +17122,7 @@
       </p:grpSpPr>
       <p:sp>
         <p:nvSpPr>
-          <p:cNvPr id="1455963747" name="Google Shape;17;p4"/>
+          <p:cNvPr id="266536854" name="Google Shape;17;p4"/>
           <p:cNvSpPr txBox="1"/>
           <p:nvPr>
             <p:ph type="title"/>
@@ -16617,7 +17264,7 @@
       </p:sp>
       <p:pic>
         <p:nvPicPr>
-          <p:cNvPr id="164130502" name=""/>
+          <p:cNvPr id="30270261" name=""/>
           <p:cNvPicPr>
             <a:picLocks noChangeAspect="1"/>
           </p:cNvPicPr>
@@ -16639,7 +17286,7 @@
       </p:pic>
       <p:pic>
         <p:nvPicPr>
-          <p:cNvPr id="269991869" name=""/>
+          <p:cNvPr id="589808383" name=""/>
           <p:cNvPicPr>
             <a:picLocks noChangeAspect="1"/>
           </p:cNvPicPr>
@@ -16694,7 +17341,7 @@
       </p:grpSpPr>
       <p:sp>
         <p:nvSpPr>
-          <p:cNvPr id="619224305" name="Google Shape;17;p4"/>
+          <p:cNvPr id="794056067" name="Google Shape;17;p4"/>
           <p:cNvSpPr txBox="1"/>
           <p:nvPr>
             <p:ph type="title"/>
@@ -16847,7 +17494,7 @@
       </p:sp>
       <p:sp>
         <p:nvSpPr>
-          <p:cNvPr id="346284601" name="Google Shape;18;p4"/>
+          <p:cNvPr id="318744460" name="Google Shape;18;p4"/>
           <p:cNvSpPr txBox="1"/>
           <p:nvPr>
             <p:ph type="body" idx="1"/>
@@ -17207,7 +17854,7 @@
       </p:sp>
       <p:pic>
         <p:nvPicPr>
-          <p:cNvPr id="1448640736" name=""/>
+          <p:cNvPr id="755691450" name=""/>
           <p:cNvPicPr>
             <a:picLocks noChangeAspect="1"/>
           </p:cNvPicPr>
@@ -17229,7 +17876,7 @@
       </p:pic>
       <p:pic>
         <p:nvPicPr>
-          <p:cNvPr id="840221945" name=""/>
+          <p:cNvPr id="1893877956" name=""/>
           <p:cNvPicPr>
             <a:picLocks noChangeAspect="1"/>
           </p:cNvPicPr>
@@ -17284,7 +17931,7 @@
       </p:grpSpPr>
       <p:sp>
         <p:nvSpPr>
-          <p:cNvPr id="154596832" name="Google Shape;17;p4"/>
+          <p:cNvPr id="1344597450" name="Google Shape;17;p4"/>
           <p:cNvSpPr txBox="1"/>
           <p:nvPr>
             <p:ph type="title"/>
@@ -17426,7 +18073,7 @@
       </p:sp>
       <p:sp>
         <p:nvSpPr>
-          <p:cNvPr id="120745062" name="Google Shape;18;p4"/>
+          <p:cNvPr id="994227644" name="Google Shape;18;p4"/>
           <p:cNvSpPr txBox="1"/>
           <p:nvPr>
             <p:ph type="body" idx="1"/>
@@ -17992,7 +18639,7 @@
       </p:sp>
       <p:pic>
         <p:nvPicPr>
-          <p:cNvPr id="1092478043" name=""/>
+          <p:cNvPr id="222426226" name=""/>
           <p:cNvPicPr>
             <a:picLocks noChangeAspect="1"/>
           </p:cNvPicPr>
@@ -18014,7 +18661,7 @@
       </p:pic>
       <p:sp>
         <p:nvSpPr>
-          <p:cNvPr id="554021379" name=""/>
+          <p:cNvPr id="1426235832" name=""/>
           <p:cNvSpPr txBox="1"/>
           <p:nvPr/>
         </p:nvSpPr>
@@ -18053,7 +18700,7 @@
       </p:sp>
       <p:pic>
         <p:nvPicPr>
-          <p:cNvPr id="299220998" name=""/>
+          <p:cNvPr id="797625943" name=""/>
           <p:cNvPicPr>
             <a:picLocks noChangeAspect="1"/>
           </p:cNvPicPr>
@@ -18108,7 +18755,7 @@
       </p:grpSpPr>
       <p:sp>
         <p:nvSpPr>
-          <p:cNvPr id="742472823" name="Google Shape;17;p4"/>
+          <p:cNvPr id="2130290849" name="Google Shape;17;p4"/>
           <p:cNvSpPr txBox="1"/>
           <p:nvPr>
             <p:ph type="title"/>
@@ -18250,7 +18897,7 @@
       </p:sp>
       <p:pic>
         <p:nvPicPr>
-          <p:cNvPr id="1976664005" name=""/>
+          <p:cNvPr id="1931501709" name=""/>
           <p:cNvPicPr>
             <a:picLocks noChangeAspect="1"/>
           </p:cNvPicPr>
@@ -18272,7 +18919,7 @@
       </p:pic>
       <p:pic>
         <p:nvPicPr>
-          <p:cNvPr id="702369104" name=""/>
+          <p:cNvPr id="2055283509" name=""/>
           <p:cNvPicPr>
             <a:picLocks noChangeAspect="1"/>
           </p:cNvPicPr>
@@ -18295,7 +18942,7 @@
       </p:pic>
       <p:pic>
         <p:nvPicPr>
-          <p:cNvPr id="992135862" name=""/>
+          <p:cNvPr id="1709372598" name=""/>
           <p:cNvPicPr>
             <a:picLocks noChangeAspect="1"/>
           </p:cNvPicPr>
@@ -18318,7 +18965,7 @@
       </p:pic>
       <p:sp>
         <p:nvSpPr>
-          <p:cNvPr id="1455516129" name=""/>
+          <p:cNvPr id="958566357" name=""/>
           <p:cNvSpPr txBox="1"/>
           <p:nvPr/>
         </p:nvSpPr>
@@ -18385,7 +19032,7 @@
       </p:sp>
       <p:sp>
         <p:nvSpPr>
-          <p:cNvPr id="1909712035" name=""/>
+          <p:cNvPr id="650882485" name=""/>
           <p:cNvSpPr txBox="1"/>
           <p:nvPr/>
         </p:nvSpPr>
@@ -18433,7 +19080,7 @@
       </p:sp>
       <p:pic>
         <p:nvPicPr>
-          <p:cNvPr id="1357202866" name=""/>
+          <p:cNvPr id="1427138521" name=""/>
           <p:cNvPicPr>
             <a:picLocks noChangeAspect="1"/>
           </p:cNvPicPr>
@@ -18488,7 +19135,7 @@
       </p:grpSpPr>
       <p:sp>
         <p:nvSpPr>
-          <p:cNvPr id="1546801793" name="Google Shape;17;p4"/>
+          <p:cNvPr id="1096134262" name="Google Shape;17;p4"/>
           <p:cNvSpPr txBox="1"/>
           <p:nvPr>
             <p:ph type="title"/>
@@ -18630,7 +19277,7 @@
       </p:sp>
       <p:pic>
         <p:nvPicPr>
-          <p:cNvPr id="1797104388" name=""/>
+          <p:cNvPr id="207990777" name=""/>
           <p:cNvPicPr>
             <a:picLocks noChangeAspect="1"/>
           </p:cNvPicPr>
@@ -18652,7 +19299,7 @@
       </p:pic>
       <p:pic>
         <p:nvPicPr>
-          <p:cNvPr id="2145988276" name=""/>
+          <p:cNvPr id="1920248368" name=""/>
           <p:cNvPicPr>
             <a:picLocks noChangeAspect="1"/>
           </p:cNvPicPr>
@@ -18707,7 +19354,7 @@
       </p:grpSpPr>
       <p:sp>
         <p:nvSpPr>
-          <p:cNvPr id="2046326404" name="Google Shape;17;p4"/>
+          <p:cNvPr id="773518595" name="Google Shape;17;p4"/>
           <p:cNvSpPr txBox="1"/>
           <p:nvPr>
             <p:ph type="title"/>
@@ -18884,7 +19531,7 @@
       </p:sp>
       <p:sp>
         <p:nvSpPr>
-          <p:cNvPr id="1330711522" name="Google Shape;18;p4"/>
+          <p:cNvPr id="1819012351" name="Google Shape;18;p4"/>
           <p:cNvSpPr txBox="1"/>
           <p:nvPr>
             <p:ph type="body" idx="1"/>
@@ -19427,7 +20074,7 @@
       </p:sp>
       <p:pic>
         <p:nvPicPr>
-          <p:cNvPr id="637006086" name=""/>
+          <p:cNvPr id="859874272" name=""/>
           <p:cNvPicPr>
             <a:picLocks noChangeAspect="1"/>
           </p:cNvPicPr>
@@ -19449,7 +20096,7 @@
       </p:pic>
       <p:pic>
         <p:nvPicPr>
-          <p:cNvPr id="1565483068" name=""/>
+          <p:cNvPr id="1941484460" name=""/>
           <p:cNvPicPr>
             <a:picLocks noChangeAspect="1"/>
           </p:cNvPicPr>

</xml_diff>